<commit_message>
changed readme, added docs
</commit_message>
<xml_diff>
--- a/Documents/prezentation.pptx
+++ b/Documents/prezentation.pptx
@@ -5,7 +5,7 @@
     <p:sldMasterId id="2147483859" r:id="rId1"/>
   </p:sldMasterIdLst>
   <p:notesMasterIdLst>
-    <p:notesMasterId r:id="rId12"/>
+    <p:notesMasterId r:id="rId14"/>
   </p:notesMasterIdLst>
   <p:sldIdLst>
     <p:sldId id="256" r:id="rId2"/>
@@ -13,11 +13,13 @@
     <p:sldId id="265" r:id="rId4"/>
     <p:sldId id="258" r:id="rId5"/>
     <p:sldId id="259" r:id="rId6"/>
-    <p:sldId id="260" r:id="rId7"/>
-    <p:sldId id="261" r:id="rId8"/>
-    <p:sldId id="264" r:id="rId9"/>
-    <p:sldId id="262" r:id="rId10"/>
-    <p:sldId id="263" r:id="rId11"/>
+    <p:sldId id="267" r:id="rId7"/>
+    <p:sldId id="260" r:id="rId8"/>
+    <p:sldId id="261" r:id="rId9"/>
+    <p:sldId id="266" r:id="rId10"/>
+    <p:sldId id="264" r:id="rId11"/>
+    <p:sldId id="262" r:id="rId12"/>
+    <p:sldId id="263" r:id="rId13"/>
   </p:sldIdLst>
   <p:sldSz cx="12192000" cy="6858000"/>
   <p:notesSz cx="6858000" cy="9144000"/>
@@ -206,7 +208,7 @@
           <a:p>
             <a:fld id="{8E0CF53D-276D-49A2-896E-2EEFA4D479EB}" type="datetimeFigureOut">
               <a:rPr lang="ru-RU" smtClean="0"/>
-              <a:t>04.10.2024</a:t>
+              <a:t>20.10.2024</a:t>
             </a:fld>
             <a:endParaRPr lang="ru-RU"/>
           </a:p>
@@ -658,7 +660,7 @@
           <a:p>
             <a:fld id="{44B6E626-27F2-4781-9A52-A85F4CDBBAB9}" type="datetime1">
               <a:rPr lang="ru-RU" smtClean="0"/>
-              <a:t>04.10.2024</a:t>
+              <a:t>20.10.2024</a:t>
             </a:fld>
             <a:endParaRPr lang="ru-RU" dirty="0"/>
           </a:p>
@@ -956,7 +958,7 @@
           <a:p>
             <a:fld id="{582125CC-BC39-468C-AC75-04F9BED99B22}" type="datetime1">
               <a:rPr lang="ru-RU" smtClean="0"/>
-              <a:t>04.10.2024</a:t>
+              <a:t>20.10.2024</a:t>
             </a:fld>
             <a:endParaRPr lang="ru-RU" dirty="0"/>
           </a:p>
@@ -1148,7 +1150,7 @@
           <a:p>
             <a:fld id="{139C6519-95D5-441A-903D-17DD8C7AE891}" type="datetime1">
               <a:rPr lang="ru-RU" smtClean="0"/>
-              <a:t>04.10.2024</a:t>
+              <a:t>20.10.2024</a:t>
             </a:fld>
             <a:endParaRPr lang="ru-RU" dirty="0"/>
           </a:p>
@@ -1409,7 +1411,7 @@
           <a:p>
             <a:fld id="{CEDB1A55-E303-4AFE-970B-2BDCCDCB71E8}" type="datetime1">
               <a:rPr lang="ru-RU" smtClean="0"/>
-              <a:t>04.10.2024</a:t>
+              <a:t>20.10.2024</a:t>
             </a:fld>
             <a:endParaRPr lang="ru-RU" dirty="0"/>
           </a:p>
@@ -1833,7 +1835,7 @@
           <a:p>
             <a:fld id="{796D98C3-FC7D-403D-95B2-DDA7D0DD4E5E}" type="datetime1">
               <a:rPr lang="ru-RU" smtClean="0"/>
-              <a:t>04.10.2024</a:t>
+              <a:t>20.10.2024</a:t>
             </a:fld>
             <a:endParaRPr lang="ru-RU" dirty="0"/>
           </a:p>
@@ -2370,7 +2372,7 @@
           <a:p>
             <a:fld id="{8945010D-051B-4CB2-8591-985BE60284F7}" type="datetime1">
               <a:rPr lang="ru-RU" smtClean="0"/>
-              <a:t>04.10.2024</a:t>
+              <a:t>20.10.2024</a:t>
             </a:fld>
             <a:endParaRPr lang="ru-RU" dirty="0"/>
           </a:p>
@@ -3234,7 +3236,7 @@
           <a:p>
             <a:fld id="{917B0656-A3A5-42EE-BA9C-3A845C1472BF}" type="datetime1">
               <a:rPr lang="ru-RU" smtClean="0"/>
-              <a:t>04.10.2024</a:t>
+              <a:t>20.10.2024</a:t>
             </a:fld>
             <a:endParaRPr lang="ru-RU" dirty="0"/>
           </a:p>
@@ -3404,7 +3406,7 @@
           <a:p>
             <a:fld id="{73B6687B-608B-4170-8C48-8C2E8C7FCB74}" type="datetime1">
               <a:rPr lang="ru-RU" smtClean="0"/>
-              <a:t>04.10.2024</a:t>
+              <a:t>20.10.2024</a:t>
             </a:fld>
             <a:endParaRPr lang="ru-RU" dirty="0"/>
           </a:p>
@@ -3588,7 +3590,7 @@
           <a:p>
             <a:fld id="{060DB343-101F-4E2A-8C0D-4D565490660A}" type="datetime1">
               <a:rPr lang="ru-RU" smtClean="0"/>
-              <a:t>04.10.2024</a:t>
+              <a:t>20.10.2024</a:t>
             </a:fld>
             <a:endParaRPr lang="ru-RU" dirty="0"/>
           </a:p>
@@ -3758,7 +3760,7 @@
           <a:p>
             <a:fld id="{36C4C450-375A-44B5-9E17-9D6265C52184}" type="datetime1">
               <a:rPr lang="ru-RU" smtClean="0"/>
-              <a:t>04.10.2024</a:t>
+              <a:t>20.10.2024</a:t>
             </a:fld>
             <a:endParaRPr lang="ru-RU" dirty="0"/>
           </a:p>
@@ -4002,7 +4004,7 @@
           <a:p>
             <a:fld id="{5BE3C4FE-D43C-4986-AFD5-318A1295B3DB}" type="datetime1">
               <a:rPr lang="ru-RU" smtClean="0"/>
-              <a:t>04.10.2024</a:t>
+              <a:t>20.10.2024</a:t>
             </a:fld>
             <a:endParaRPr lang="ru-RU" dirty="0"/>
           </a:p>
@@ -4238,7 +4240,7 @@
           <a:p>
             <a:fld id="{5FA9E6E9-C041-4FA2-9F02-5EF556A0B60B}" type="datetime1">
               <a:rPr lang="ru-RU" smtClean="0"/>
-              <a:t>04.10.2024</a:t>
+              <a:t>20.10.2024</a:t>
             </a:fld>
             <a:endParaRPr lang="ru-RU" dirty="0"/>
           </a:p>
@@ -4704,7 +4706,7 @@
           <a:p>
             <a:fld id="{949B3955-2071-4C3B-A870-C140665F5872}" type="datetime1">
               <a:rPr lang="ru-RU" smtClean="0"/>
-              <a:t>04.10.2024</a:t>
+              <a:t>20.10.2024</a:t>
             </a:fld>
             <a:endParaRPr lang="ru-RU" dirty="0"/>
           </a:p>
@@ -4822,7 +4824,7 @@
           <a:p>
             <a:fld id="{CD1FDFB9-F453-49D3-94CB-4AF341F42A0F}" type="datetime1">
               <a:rPr lang="ru-RU" smtClean="0"/>
-              <a:t>04.10.2024</a:t>
+              <a:t>20.10.2024</a:t>
             </a:fld>
             <a:endParaRPr lang="ru-RU" dirty="0"/>
           </a:p>
@@ -4917,7 +4919,7 @@
           <a:p>
             <a:fld id="{CE728DDE-5116-4C75-B2F6-EEC597206EDD}" type="datetime1">
               <a:rPr lang="ru-RU" smtClean="0"/>
-              <a:t>04.10.2024</a:t>
+              <a:t>20.10.2024</a:t>
             </a:fld>
             <a:endParaRPr lang="ru-RU" dirty="0"/>
           </a:p>
@@ -5172,7 +5174,7 @@
           <a:p>
             <a:fld id="{5FDC3E98-2A54-475F-9316-048BE6D5A3E8}" type="datetime1">
               <a:rPr lang="ru-RU" smtClean="0"/>
-              <a:t>04.10.2024</a:t>
+              <a:t>20.10.2024</a:t>
             </a:fld>
             <a:endParaRPr lang="ru-RU" dirty="0"/>
           </a:p>
@@ -5472,7 +5474,7 @@
           <a:p>
             <a:fld id="{F276279F-0AB6-41C2-A46C-C38D9329E017}" type="datetime1">
               <a:rPr lang="ru-RU" smtClean="0"/>
-              <a:t>04.10.2024</a:t>
+              <a:t>20.10.2024</a:t>
             </a:fld>
             <a:endParaRPr lang="ru-RU" dirty="0"/>
           </a:p>
@@ -5706,7 +5708,7 @@
           <a:p>
             <a:fld id="{805B6573-7BD9-40FD-AFC1-752F516BDB29}" type="datetime1">
               <a:rPr lang="ru-RU" smtClean="0"/>
-              <a:t>04.10.2024</a:t>
+              <a:t>20.10.2024</a:t>
             </a:fld>
             <a:endParaRPr lang="ru-RU"/>
           </a:p>
@@ -6544,1087 +6546,6 @@
           <p:cNvPr id="2" name="Заголовок 1">
             <a:extLst>
               <a:ext uri="{FF2B5EF4-FFF2-40B4-BE49-F238E27FC236}">
-                <a16:creationId xmlns:a16="http://schemas.microsoft.com/office/drawing/2014/main" id="{1E288B05-1367-4C5D-84AD-794CB02CD9D6}"/>
-              </a:ext>
-            </a:extLst>
-          </p:cNvPr>
-          <p:cNvSpPr>
-            <a:spLocks noGrp="1"/>
-          </p:cNvSpPr>
-          <p:nvPr>
-            <p:ph type="title"/>
-          </p:nvPr>
-        </p:nvSpPr>
-        <p:spPr/>
-        <p:txBody>
-          <a:bodyPr anchor="t">
-            <a:normAutofit fontScale="90000"/>
-          </a:bodyPr>
-          <a:lstStyle/>
-          <a:p>
-            <a:pPr algn="ctr"/>
-            <a:r>
-              <a:rPr lang="ru-RU" dirty="0"/>
-              <a:t>Благодарят вас за внимание члены команды:</a:t>
-            </a:r>
-          </a:p>
-        </p:txBody>
-      </p:sp>
-      <p:sp>
-        <p:nvSpPr>
-          <p:cNvPr id="3" name="Объект 2">
-            <a:extLst>
-              <a:ext uri="{FF2B5EF4-FFF2-40B4-BE49-F238E27FC236}">
-                <a16:creationId xmlns:a16="http://schemas.microsoft.com/office/drawing/2014/main" id="{B36FE170-15E3-40E6-951F-19D58B2D73EE}"/>
-              </a:ext>
-            </a:extLst>
-          </p:cNvPr>
-          <p:cNvSpPr>
-            <a:spLocks noGrp="1"/>
-          </p:cNvSpPr>
-          <p:nvPr>
-            <p:ph idx="1"/>
-          </p:nvPr>
-        </p:nvSpPr>
-        <p:spPr/>
-        <p:txBody>
-          <a:bodyPr>
-            <a:normAutofit/>
-          </a:bodyPr>
-          <a:lstStyle/>
-          <a:p>
-            <a:r>
-              <a:rPr lang="ru-RU" sz="3200" dirty="0"/>
-              <a:t>Винокуров Владислав Александрович – </a:t>
-            </a:r>
-            <a:r>
-              <a:rPr lang="en-US" sz="3200" dirty="0"/>
-              <a:t>backend</a:t>
-            </a:r>
-            <a:r>
-              <a:rPr lang="ru-RU" sz="3200" dirty="0"/>
-              <a:t> разработчик</a:t>
-            </a:r>
-          </a:p>
-          <a:p>
-            <a:endParaRPr lang="ru-RU" sz="3200" dirty="0"/>
-          </a:p>
-          <a:p>
-            <a:r>
-              <a:rPr lang="ru-RU" sz="3200" dirty="0"/>
-              <a:t>Шевченко Даниил Юрьевич – </a:t>
-            </a:r>
-            <a:r>
-              <a:rPr lang="en-US" sz="3200" dirty="0"/>
-              <a:t>frontend  </a:t>
-            </a:r>
-            <a:r>
-              <a:rPr lang="ru-RU" sz="3200" dirty="0"/>
-              <a:t>разработчик, дизайнер</a:t>
-            </a:r>
-          </a:p>
-        </p:txBody>
-      </p:sp>
-      <p:sp>
-        <p:nvSpPr>
-          <p:cNvPr id="5" name="Номер слайда 4">
-            <a:extLst>
-              <a:ext uri="{FF2B5EF4-FFF2-40B4-BE49-F238E27FC236}">
-                <a16:creationId xmlns:a16="http://schemas.microsoft.com/office/drawing/2014/main" id="{85E9646B-A5D9-4D6E-868F-1798C1B5A5DE}"/>
-              </a:ext>
-            </a:extLst>
-          </p:cNvPr>
-          <p:cNvSpPr>
-            <a:spLocks noGrp="1"/>
-          </p:cNvSpPr>
-          <p:nvPr>
-            <p:ph type="sldNum" sz="quarter" idx="12"/>
-          </p:nvPr>
-        </p:nvSpPr>
-        <p:spPr/>
-        <p:txBody>
-          <a:bodyPr/>
-          <a:lstStyle/>
-          <a:p>
-            <a:fld id="{02A24B53-BD4C-4445-BAE1-C9D880719956}" type="slidenum">
-              <a:rPr lang="ru-RU" sz="3600" smtClean="0"/>
-              <a:t>10</a:t>
-            </a:fld>
-            <a:endParaRPr lang="ru-RU" sz="2800" dirty="0"/>
-          </a:p>
-        </p:txBody>
-      </p:sp>
-    </p:spTree>
-    <p:extLst>
-      <p:ext uri="{BB962C8B-B14F-4D97-AF65-F5344CB8AC3E}">
-        <p14:creationId xmlns:p14="http://schemas.microsoft.com/office/powerpoint/2010/main" val="3653499641"/>
-      </p:ext>
-    </p:extLst>
-  </p:cSld>
-  <p:clrMapOvr>
-    <a:masterClrMapping/>
-  </p:clrMapOvr>
-</p:sld>
-</file>
-
-<file path=ppt/slides/slide2.xml><?xml version="1.0" encoding="utf-8"?>
-<p:sld xmlns:a="http://schemas.openxmlformats.org/drawingml/2006/main" xmlns:r="http://schemas.openxmlformats.org/officeDocument/2006/relationships" xmlns:p="http://schemas.openxmlformats.org/presentationml/2006/main">
-  <p:cSld>
-    <p:spTree>
-      <p:nvGrpSpPr>
-        <p:cNvPr id="1" name=""/>
-        <p:cNvGrpSpPr/>
-        <p:nvPr/>
-      </p:nvGrpSpPr>
-      <p:grpSpPr>
-        <a:xfrm>
-          <a:off x="0" y="0"/>
-          <a:ext cx="0" cy="0"/>
-          <a:chOff x="0" y="0"/>
-          <a:chExt cx="0" cy="0"/>
-        </a:xfrm>
-      </p:grpSpPr>
-      <p:sp>
-        <p:nvSpPr>
-          <p:cNvPr id="2" name="Заголовок 1">
-            <a:extLst>
-              <a:ext uri="{FF2B5EF4-FFF2-40B4-BE49-F238E27FC236}">
-                <a16:creationId xmlns:a16="http://schemas.microsoft.com/office/drawing/2014/main" id="{E183D320-83D6-4D81-835C-90876FA421A5}"/>
-              </a:ext>
-            </a:extLst>
-          </p:cNvPr>
-          <p:cNvSpPr>
-            <a:spLocks noGrp="1"/>
-          </p:cNvSpPr>
-          <p:nvPr>
-            <p:ph type="title"/>
-          </p:nvPr>
-        </p:nvSpPr>
-        <p:spPr>
-          <a:xfrm>
-            <a:off x="1249680" y="0"/>
-            <a:ext cx="9692640" cy="1828800"/>
-          </a:xfrm>
-        </p:spPr>
-        <p:txBody>
-          <a:bodyPr anchor="t">
-            <a:normAutofit/>
-          </a:bodyPr>
-          <a:lstStyle/>
-          <a:p>
-            <a:r>
-              <a:rPr lang="ru-RU" sz="6000" dirty="0"/>
-              <a:t>Введение</a:t>
-            </a:r>
-          </a:p>
-        </p:txBody>
-      </p:sp>
-      <p:sp>
-        <p:nvSpPr>
-          <p:cNvPr id="3" name="Объект 2">
-            <a:extLst>
-              <a:ext uri="{FF2B5EF4-FFF2-40B4-BE49-F238E27FC236}">
-                <a16:creationId xmlns:a16="http://schemas.microsoft.com/office/drawing/2014/main" id="{3CA0E137-F6D9-4561-A25C-EBB3EF168510}"/>
-              </a:ext>
-            </a:extLst>
-          </p:cNvPr>
-          <p:cNvSpPr>
-            <a:spLocks noGrp="1"/>
-          </p:cNvSpPr>
-          <p:nvPr>
-            <p:ph idx="1"/>
-          </p:nvPr>
-        </p:nvSpPr>
-        <p:spPr>
-          <a:xfrm>
-            <a:off x="1249680" y="1828800"/>
-            <a:ext cx="8595360" cy="3512438"/>
-          </a:xfrm>
-        </p:spPr>
-        <p:txBody>
-          <a:bodyPr>
-            <a:normAutofit/>
-          </a:bodyPr>
-          <a:lstStyle/>
-          <a:p>
-            <a:r>
-              <a:rPr lang="ru-RU" sz="3200" dirty="0"/>
-              <a:t>Многие сайты посвящены продаже</a:t>
-            </a:r>
-          </a:p>
-          <a:p>
-            <a:r>
-              <a:rPr lang="ru-RU" sz="3200" dirty="0"/>
-              <a:t>Малое количество профильных сайтов в России</a:t>
-            </a:r>
-          </a:p>
-          <a:p>
-            <a:r>
-              <a:rPr lang="ru-RU" sz="3200" dirty="0"/>
-              <a:t>Растущий спрос в последние 3 года</a:t>
-            </a:r>
-          </a:p>
-          <a:p>
-            <a:endParaRPr lang="ru-RU" sz="3200" dirty="0"/>
-          </a:p>
-        </p:txBody>
-      </p:sp>
-      <p:sp>
-        <p:nvSpPr>
-          <p:cNvPr id="5" name="Номер слайда 4">
-            <a:extLst>
-              <a:ext uri="{FF2B5EF4-FFF2-40B4-BE49-F238E27FC236}">
-                <a16:creationId xmlns:a16="http://schemas.microsoft.com/office/drawing/2014/main" id="{F4B61EFF-71A7-4077-B61C-F66F0949A071}"/>
-              </a:ext>
-            </a:extLst>
-          </p:cNvPr>
-          <p:cNvSpPr>
-            <a:spLocks noGrp="1"/>
-          </p:cNvSpPr>
-          <p:nvPr>
-            <p:ph type="sldNum" sz="quarter" idx="12"/>
-          </p:nvPr>
-        </p:nvSpPr>
-        <p:spPr/>
-        <p:txBody>
-          <a:bodyPr/>
-          <a:lstStyle/>
-          <a:p>
-            <a:fld id="{02A24B53-BD4C-4445-BAE1-C9D880719956}" type="slidenum">
-              <a:rPr lang="ru-RU" sz="3600" smtClean="0"/>
-              <a:t>2</a:t>
-            </a:fld>
-            <a:endParaRPr lang="ru-RU" sz="2800" dirty="0"/>
-          </a:p>
-        </p:txBody>
-      </p:sp>
-      <p:pic>
-        <p:nvPicPr>
-          <p:cNvPr id="6" name="Рисунок 5">
-            <a:extLst>
-              <a:ext uri="{FF2B5EF4-FFF2-40B4-BE49-F238E27FC236}">
-                <a16:creationId xmlns:a16="http://schemas.microsoft.com/office/drawing/2014/main" id="{BA8111FC-44BE-42D6-B67A-BCA2145C9F39}"/>
-              </a:ext>
-            </a:extLst>
-          </p:cNvPr>
-          <p:cNvPicPr>
-            <a:picLocks noChangeAspect="1"/>
-          </p:cNvPicPr>
-          <p:nvPr/>
-        </p:nvPicPr>
-        <p:blipFill>
-          <a:blip r:embed="rId2"/>
-          <a:stretch>
-            <a:fillRect/>
-          </a:stretch>
-        </p:blipFill>
-        <p:spPr>
-          <a:xfrm>
-            <a:off x="288488" y="4270619"/>
-            <a:ext cx="10558477" cy="2343477"/>
-          </a:xfrm>
-          <a:prstGeom prst="rect">
-            <a:avLst/>
-          </a:prstGeom>
-        </p:spPr>
-      </p:pic>
-    </p:spTree>
-    <p:extLst>
-      <p:ext uri="{BB962C8B-B14F-4D97-AF65-F5344CB8AC3E}">
-        <p14:creationId xmlns:p14="http://schemas.microsoft.com/office/powerpoint/2010/main" val="2068369394"/>
-      </p:ext>
-    </p:extLst>
-  </p:cSld>
-  <p:clrMapOvr>
-    <a:masterClrMapping/>
-  </p:clrMapOvr>
-</p:sld>
-</file>
-
-<file path=ppt/slides/slide3.xml><?xml version="1.0" encoding="utf-8"?>
-<p:sld xmlns:a="http://schemas.openxmlformats.org/drawingml/2006/main" xmlns:r="http://schemas.openxmlformats.org/officeDocument/2006/relationships" xmlns:p="http://schemas.openxmlformats.org/presentationml/2006/main">
-  <p:cSld>
-    <p:spTree>
-      <p:nvGrpSpPr>
-        <p:cNvPr id="1" name=""/>
-        <p:cNvGrpSpPr/>
-        <p:nvPr/>
-      </p:nvGrpSpPr>
-      <p:grpSpPr>
-        <a:xfrm>
-          <a:off x="0" y="0"/>
-          <a:ext cx="0" cy="0"/>
-          <a:chOff x="0" y="0"/>
-          <a:chExt cx="0" cy="0"/>
-        </a:xfrm>
-      </p:grpSpPr>
-      <p:sp>
-        <p:nvSpPr>
-          <p:cNvPr id="2" name="Заголовок 1">
-            <a:extLst>
-              <a:ext uri="{FF2B5EF4-FFF2-40B4-BE49-F238E27FC236}">
-                <a16:creationId xmlns:a16="http://schemas.microsoft.com/office/drawing/2014/main" id="{216E6AF0-19CF-424C-B6F7-5E7304E637EA}"/>
-              </a:ext>
-            </a:extLst>
-          </p:cNvPr>
-          <p:cNvSpPr>
-            <a:spLocks noGrp="1"/>
-          </p:cNvSpPr>
-          <p:nvPr>
-            <p:ph type="title"/>
-          </p:nvPr>
-        </p:nvSpPr>
-        <p:spPr/>
-        <p:txBody>
-          <a:bodyPr anchor="t"/>
-          <a:lstStyle/>
-          <a:p>
-            <a:r>
-              <a:rPr lang="ru-RU" dirty="0"/>
-              <a:t>Перспективы через 8 лет</a:t>
-            </a:r>
-          </a:p>
-        </p:txBody>
-      </p:sp>
-      <p:pic>
-        <p:nvPicPr>
-          <p:cNvPr id="6" name="Объект 5">
-            <a:extLst>
-              <a:ext uri="{FF2B5EF4-FFF2-40B4-BE49-F238E27FC236}">
-                <a16:creationId xmlns:a16="http://schemas.microsoft.com/office/drawing/2014/main" id="{FD363FA3-6900-49A0-A0AA-374484E012A8}"/>
-              </a:ext>
-            </a:extLst>
-          </p:cNvPr>
-          <p:cNvPicPr>
-            <a:picLocks noGrp="1" noChangeAspect="1"/>
-          </p:cNvPicPr>
-          <p:nvPr>
-            <p:ph idx="1"/>
-          </p:nvPr>
-        </p:nvPicPr>
-        <p:blipFill>
-          <a:blip r:embed="rId2">
-            <a:extLst>
-              <a:ext uri="{28A0092B-C50C-407E-A947-70E740481C1C}">
-                <a14:useLocalDpi xmlns:a14="http://schemas.microsoft.com/office/drawing/2010/main" val="0"/>
-              </a:ext>
-            </a:extLst>
-          </a:blip>
-          <a:stretch>
-            <a:fillRect/>
-          </a:stretch>
-        </p:blipFill>
-        <p:spPr>
-          <a:xfrm>
-            <a:off x="2768333" y="1330045"/>
-            <a:ext cx="6644686" cy="5227446"/>
-          </a:xfrm>
-        </p:spPr>
-      </p:pic>
-      <p:sp>
-        <p:nvSpPr>
-          <p:cNvPr id="4" name="Номер слайда 3">
-            <a:extLst>
-              <a:ext uri="{FF2B5EF4-FFF2-40B4-BE49-F238E27FC236}">
-                <a16:creationId xmlns:a16="http://schemas.microsoft.com/office/drawing/2014/main" id="{D5A24EA9-8062-4FDC-A748-ECADE9B53492}"/>
-              </a:ext>
-            </a:extLst>
-          </p:cNvPr>
-          <p:cNvSpPr>
-            <a:spLocks noGrp="1"/>
-          </p:cNvSpPr>
-          <p:nvPr>
-            <p:ph type="sldNum" sz="quarter" idx="12"/>
-          </p:nvPr>
-        </p:nvSpPr>
-        <p:spPr/>
-        <p:txBody>
-          <a:bodyPr/>
-          <a:lstStyle/>
-          <a:p>
-            <a:fld id="{02A24B53-BD4C-4445-BAE1-C9D880719956}" type="slidenum">
-              <a:rPr lang="ru-RU" sz="3600" smtClean="0"/>
-              <a:t>3</a:t>
-            </a:fld>
-            <a:endParaRPr lang="ru-RU" sz="3600" dirty="0"/>
-          </a:p>
-        </p:txBody>
-      </p:sp>
-      <p:sp>
-        <p:nvSpPr>
-          <p:cNvPr id="7" name="TextBox 6">
-            <a:extLst>
-              <a:ext uri="{FF2B5EF4-FFF2-40B4-BE49-F238E27FC236}">
-                <a16:creationId xmlns:a16="http://schemas.microsoft.com/office/drawing/2014/main" id="{E5C6901B-9310-4641-9FB5-8580A5A2F065}"/>
-              </a:ext>
-            </a:extLst>
-          </p:cNvPr>
-          <p:cNvSpPr txBox="1"/>
-          <p:nvPr/>
-        </p:nvSpPr>
-        <p:spPr>
-          <a:xfrm>
-            <a:off x="0" y="6550223"/>
-            <a:ext cx="6857134" cy="307777"/>
-          </a:xfrm>
-          <a:prstGeom prst="rect">
-            <a:avLst/>
-          </a:prstGeom>
-          <a:noFill/>
-        </p:spPr>
-        <p:txBody>
-          <a:bodyPr wrap="none" rtlCol="0">
-            <a:spAutoFit/>
-          </a:bodyPr>
-          <a:lstStyle/>
-          <a:p>
-            <a:r>
-              <a:rPr lang="en-US" sz="1400" dirty="0"/>
-              <a:t>https://www.businessresearchinsights.com/market-reports/trading-card-market-102964</a:t>
-            </a:r>
-            <a:endParaRPr lang="ru-RU" sz="1400" dirty="0"/>
-          </a:p>
-        </p:txBody>
-      </p:sp>
-    </p:spTree>
-    <p:extLst>
-      <p:ext uri="{BB962C8B-B14F-4D97-AF65-F5344CB8AC3E}">
-        <p14:creationId xmlns:p14="http://schemas.microsoft.com/office/powerpoint/2010/main" val="2367829832"/>
-      </p:ext>
-    </p:extLst>
-  </p:cSld>
-  <p:clrMapOvr>
-    <a:masterClrMapping/>
-  </p:clrMapOvr>
-</p:sld>
-</file>
-
-<file path=ppt/slides/slide4.xml><?xml version="1.0" encoding="utf-8"?>
-<p:sld xmlns:a="http://schemas.openxmlformats.org/drawingml/2006/main" xmlns:r="http://schemas.openxmlformats.org/officeDocument/2006/relationships" xmlns:p="http://schemas.openxmlformats.org/presentationml/2006/main">
-  <p:cSld>
-    <p:spTree>
-      <p:nvGrpSpPr>
-        <p:cNvPr id="1" name=""/>
-        <p:cNvGrpSpPr/>
-        <p:nvPr/>
-      </p:nvGrpSpPr>
-      <p:grpSpPr>
-        <a:xfrm>
-          <a:off x="0" y="0"/>
-          <a:ext cx="0" cy="0"/>
-          <a:chOff x="0" y="0"/>
-          <a:chExt cx="0" cy="0"/>
-        </a:xfrm>
-      </p:grpSpPr>
-      <p:sp>
-        <p:nvSpPr>
-          <p:cNvPr id="2" name="Заголовок 1">
-            <a:extLst>
-              <a:ext uri="{FF2B5EF4-FFF2-40B4-BE49-F238E27FC236}">
-                <a16:creationId xmlns:a16="http://schemas.microsoft.com/office/drawing/2014/main" id="{F1166004-2872-4A26-98F4-7B8B2D134377}"/>
-              </a:ext>
-            </a:extLst>
-          </p:cNvPr>
-          <p:cNvSpPr>
-            <a:spLocks noGrp="1"/>
-          </p:cNvSpPr>
-          <p:nvPr>
-            <p:ph type="title"/>
-          </p:nvPr>
-        </p:nvSpPr>
-        <p:spPr>
-          <a:xfrm>
-            <a:off x="913795" y="-1"/>
-            <a:ext cx="10353762" cy="2021747"/>
-          </a:xfrm>
-        </p:spPr>
-        <p:txBody>
-          <a:bodyPr anchor="t">
-            <a:normAutofit/>
-          </a:bodyPr>
-          <a:lstStyle/>
-          <a:p>
-            <a:pPr algn="ctr"/>
-            <a:r>
-              <a:rPr lang="ru-RU" sz="5400" dirty="0"/>
-              <a:t>Предлагаемое решение</a:t>
-            </a:r>
-          </a:p>
-        </p:txBody>
-      </p:sp>
-      <p:sp>
-        <p:nvSpPr>
-          <p:cNvPr id="3" name="Объект 2">
-            <a:extLst>
-              <a:ext uri="{FF2B5EF4-FFF2-40B4-BE49-F238E27FC236}">
-                <a16:creationId xmlns:a16="http://schemas.microsoft.com/office/drawing/2014/main" id="{97C7B70D-867B-4ECC-868E-A661127A7C7D}"/>
-              </a:ext>
-            </a:extLst>
-          </p:cNvPr>
-          <p:cNvSpPr>
-            <a:spLocks noGrp="1"/>
-          </p:cNvSpPr>
-          <p:nvPr>
-            <p:ph idx="1"/>
-          </p:nvPr>
-        </p:nvSpPr>
-        <p:spPr>
-          <a:xfrm>
-            <a:off x="1810512" y="3212984"/>
-            <a:ext cx="8595360" cy="4351337"/>
-          </a:xfrm>
-        </p:spPr>
-        <p:txBody>
-          <a:bodyPr>
-            <a:normAutofit/>
-          </a:bodyPr>
-          <a:lstStyle/>
-          <a:p>
-            <a:pPr marL="0" indent="0" algn="ctr">
-              <a:buNone/>
-            </a:pPr>
-            <a:r>
-              <a:rPr lang="ru-RU" sz="4000" dirty="0"/>
-              <a:t>Веб-приложение </a:t>
-            </a:r>
-            <a:r>
-              <a:rPr lang="en-US" sz="4000" dirty="0"/>
-              <a:t>Card Trader </a:t>
-            </a:r>
-            <a:r>
-              <a:rPr lang="ru-RU" sz="4000" dirty="0"/>
-              <a:t>для обмена коллекционными карточками и наборами</a:t>
-            </a:r>
-          </a:p>
-        </p:txBody>
-      </p:sp>
-      <p:pic>
-        <p:nvPicPr>
-          <p:cNvPr id="5" name="Рисунок 4">
-            <a:extLst>
-              <a:ext uri="{FF2B5EF4-FFF2-40B4-BE49-F238E27FC236}">
-                <a16:creationId xmlns:a16="http://schemas.microsoft.com/office/drawing/2014/main" id="{0159BED2-E656-4B4A-BFAA-F77CA3D3D6F6}"/>
-              </a:ext>
-            </a:extLst>
-          </p:cNvPr>
-          <p:cNvPicPr>
-            <a:picLocks noChangeAspect="1"/>
-          </p:cNvPicPr>
-          <p:nvPr/>
-        </p:nvPicPr>
-        <p:blipFill>
-          <a:blip r:embed="rId2">
-            <a:extLst>
-              <a:ext uri="{28A0092B-C50C-407E-A947-70E740481C1C}">
-                <a14:useLocalDpi xmlns:a14="http://schemas.microsoft.com/office/drawing/2010/main" val="0"/>
-              </a:ext>
-            </a:extLst>
-          </a:blip>
-          <a:stretch>
-            <a:fillRect/>
-          </a:stretch>
-        </p:blipFill>
-        <p:spPr>
-          <a:xfrm>
-            <a:off x="2017680" y="-2917486"/>
-            <a:ext cx="8145991" cy="10473417"/>
-          </a:xfrm>
-          <a:prstGeom prst="rect">
-            <a:avLst/>
-          </a:prstGeom>
-        </p:spPr>
-      </p:pic>
-      <p:sp>
-        <p:nvSpPr>
-          <p:cNvPr id="7" name="Номер слайда 6">
-            <a:extLst>
-              <a:ext uri="{FF2B5EF4-FFF2-40B4-BE49-F238E27FC236}">
-                <a16:creationId xmlns:a16="http://schemas.microsoft.com/office/drawing/2014/main" id="{A0E79290-1BFB-4616-A592-2975C6C157A1}"/>
-              </a:ext>
-            </a:extLst>
-          </p:cNvPr>
-          <p:cNvSpPr>
-            <a:spLocks noGrp="1"/>
-          </p:cNvSpPr>
-          <p:nvPr>
-            <p:ph type="sldNum" sz="quarter" idx="12"/>
-          </p:nvPr>
-        </p:nvSpPr>
-        <p:spPr/>
-        <p:txBody>
-          <a:bodyPr/>
-          <a:lstStyle/>
-          <a:p>
-            <a:fld id="{02A24B53-BD4C-4445-BAE1-C9D880719956}" type="slidenum">
-              <a:rPr lang="ru-RU" sz="3600" smtClean="0"/>
-              <a:t>4</a:t>
-            </a:fld>
-            <a:endParaRPr lang="ru-RU" sz="2800" dirty="0"/>
-          </a:p>
-        </p:txBody>
-      </p:sp>
-    </p:spTree>
-    <p:extLst>
-      <p:ext uri="{BB962C8B-B14F-4D97-AF65-F5344CB8AC3E}">
-        <p14:creationId xmlns:p14="http://schemas.microsoft.com/office/powerpoint/2010/main" val="3460240273"/>
-      </p:ext>
-    </p:extLst>
-  </p:cSld>
-  <p:clrMapOvr>
-    <a:masterClrMapping/>
-  </p:clrMapOvr>
-</p:sld>
-</file>
-
-<file path=ppt/slides/slide5.xml><?xml version="1.0" encoding="utf-8"?>
-<p:sld xmlns:a="http://schemas.openxmlformats.org/drawingml/2006/main" xmlns:r="http://schemas.openxmlformats.org/officeDocument/2006/relationships" xmlns:p="http://schemas.openxmlformats.org/presentationml/2006/main">
-  <p:cSld>
-    <p:spTree>
-      <p:nvGrpSpPr>
-        <p:cNvPr id="1" name=""/>
-        <p:cNvGrpSpPr/>
-        <p:nvPr/>
-      </p:nvGrpSpPr>
-      <p:grpSpPr>
-        <a:xfrm>
-          <a:off x="0" y="0"/>
-          <a:ext cx="0" cy="0"/>
-          <a:chOff x="0" y="0"/>
-          <a:chExt cx="0" cy="0"/>
-        </a:xfrm>
-      </p:grpSpPr>
-      <p:sp>
-        <p:nvSpPr>
-          <p:cNvPr id="2" name="Заголовок 1">
-            <a:extLst>
-              <a:ext uri="{FF2B5EF4-FFF2-40B4-BE49-F238E27FC236}">
-                <a16:creationId xmlns:a16="http://schemas.microsoft.com/office/drawing/2014/main" id="{9F160AFA-F51A-4B3C-9066-00CFC43A23AA}"/>
-              </a:ext>
-            </a:extLst>
-          </p:cNvPr>
-          <p:cNvSpPr>
-            <a:spLocks noGrp="1"/>
-          </p:cNvSpPr>
-          <p:nvPr>
-            <p:ph type="title"/>
-          </p:nvPr>
-        </p:nvSpPr>
-        <p:spPr>
-          <a:xfrm>
-            <a:off x="1097280" y="286603"/>
-            <a:ext cx="10058400" cy="829133"/>
-          </a:xfrm>
-        </p:spPr>
-        <p:txBody>
-          <a:bodyPr>
-            <a:normAutofit/>
-          </a:bodyPr>
-          <a:lstStyle/>
-          <a:p>
-            <a:pPr algn="ctr"/>
-            <a:endParaRPr lang="ru-RU" dirty="0"/>
-          </a:p>
-        </p:txBody>
-      </p:sp>
-      <p:pic>
-        <p:nvPicPr>
-          <p:cNvPr id="22" name="Объект 21">
-            <a:extLst>
-              <a:ext uri="{FF2B5EF4-FFF2-40B4-BE49-F238E27FC236}">
-                <a16:creationId xmlns:a16="http://schemas.microsoft.com/office/drawing/2014/main" id="{610B5971-4392-4D8E-8B28-BE17D2EF22DE}"/>
-              </a:ext>
-            </a:extLst>
-          </p:cNvPr>
-          <p:cNvPicPr>
-            <a:picLocks noGrp="1" noChangeAspect="1"/>
-          </p:cNvPicPr>
-          <p:nvPr>
-            <p:ph idx="1"/>
-          </p:nvPr>
-        </p:nvPicPr>
-        <p:blipFill>
-          <a:blip r:embed="rId2">
-            <a:extLst>
-              <a:ext uri="{28A0092B-C50C-407E-A947-70E740481C1C}">
-                <a14:useLocalDpi xmlns:a14="http://schemas.microsoft.com/office/drawing/2010/main" val="0"/>
-              </a:ext>
-            </a:extLst>
-          </a:blip>
-          <a:stretch>
-            <a:fillRect/>
-          </a:stretch>
-        </p:blipFill>
-        <p:spPr>
-          <a:xfrm>
-            <a:off x="-145924" y="-190500"/>
-            <a:ext cx="11413480" cy="6761897"/>
-          </a:xfrm>
-        </p:spPr>
-      </p:pic>
-      <p:sp>
-        <p:nvSpPr>
-          <p:cNvPr id="24" name="Номер слайда 23">
-            <a:extLst>
-              <a:ext uri="{FF2B5EF4-FFF2-40B4-BE49-F238E27FC236}">
-                <a16:creationId xmlns:a16="http://schemas.microsoft.com/office/drawing/2014/main" id="{A044B873-A0E0-432C-BB3A-6CA63FBFA2A5}"/>
-              </a:ext>
-            </a:extLst>
-          </p:cNvPr>
-          <p:cNvSpPr>
-            <a:spLocks noGrp="1"/>
-          </p:cNvSpPr>
-          <p:nvPr>
-            <p:ph type="sldNum" sz="quarter" idx="12"/>
-          </p:nvPr>
-        </p:nvSpPr>
-        <p:spPr/>
-        <p:txBody>
-          <a:bodyPr/>
-          <a:lstStyle/>
-          <a:p>
-            <a:fld id="{02A24B53-BD4C-4445-BAE1-C9D880719956}" type="slidenum">
-              <a:rPr lang="ru-RU" sz="3600" smtClean="0"/>
-              <a:t>5</a:t>
-            </a:fld>
-            <a:endParaRPr lang="ru-RU" sz="2800" dirty="0"/>
-          </a:p>
-        </p:txBody>
-      </p:sp>
-    </p:spTree>
-    <p:extLst>
-      <p:ext uri="{BB962C8B-B14F-4D97-AF65-F5344CB8AC3E}">
-        <p14:creationId xmlns:p14="http://schemas.microsoft.com/office/powerpoint/2010/main" val="4258705114"/>
-      </p:ext>
-    </p:extLst>
-  </p:cSld>
-  <p:clrMapOvr>
-    <a:masterClrMapping/>
-  </p:clrMapOvr>
-</p:sld>
-</file>
-
-<file path=ppt/slides/slide6.xml><?xml version="1.0" encoding="utf-8"?>
-<p:sld xmlns:a="http://schemas.openxmlformats.org/drawingml/2006/main" xmlns:r="http://schemas.openxmlformats.org/officeDocument/2006/relationships" xmlns:p="http://schemas.openxmlformats.org/presentationml/2006/main">
-  <p:cSld>
-    <p:spTree>
-      <p:nvGrpSpPr>
-        <p:cNvPr id="1" name=""/>
-        <p:cNvGrpSpPr/>
-        <p:nvPr/>
-      </p:nvGrpSpPr>
-      <p:grpSpPr>
-        <a:xfrm>
-          <a:off x="0" y="0"/>
-          <a:ext cx="0" cy="0"/>
-          <a:chOff x="0" y="0"/>
-          <a:chExt cx="0" cy="0"/>
-        </a:xfrm>
-      </p:grpSpPr>
-      <p:sp>
-        <p:nvSpPr>
-          <p:cNvPr id="2" name="Заголовок 1">
-            <a:extLst>
-              <a:ext uri="{FF2B5EF4-FFF2-40B4-BE49-F238E27FC236}">
-                <a16:creationId xmlns:a16="http://schemas.microsoft.com/office/drawing/2014/main" id="{06E74D8C-D643-4DCE-9C86-E732F6849A55}"/>
-              </a:ext>
-            </a:extLst>
-          </p:cNvPr>
-          <p:cNvSpPr>
-            <a:spLocks noGrp="1"/>
-          </p:cNvSpPr>
-          <p:nvPr>
-            <p:ph type="title"/>
-          </p:nvPr>
-        </p:nvSpPr>
-        <p:spPr>
-          <a:xfrm>
-            <a:off x="1097280" y="286604"/>
-            <a:ext cx="10058400" cy="337462"/>
-          </a:xfrm>
-        </p:spPr>
-        <p:txBody>
-          <a:bodyPr>
-            <a:noAutofit/>
-          </a:bodyPr>
-          <a:lstStyle/>
-          <a:p>
-            <a:pPr algn="ctr"/>
-            <a:r>
-              <a:rPr lang="ru-RU" sz="4400" dirty="0"/>
-              <a:t>Главная страница</a:t>
-            </a:r>
-          </a:p>
-        </p:txBody>
-      </p:sp>
-      <p:sp>
-        <p:nvSpPr>
-          <p:cNvPr id="3" name="Объект 2">
-            <a:extLst>
-              <a:ext uri="{FF2B5EF4-FFF2-40B4-BE49-F238E27FC236}">
-                <a16:creationId xmlns:a16="http://schemas.microsoft.com/office/drawing/2014/main" id="{CCA093B3-D07E-4F51-99F6-2E837A19D81E}"/>
-              </a:ext>
-            </a:extLst>
-          </p:cNvPr>
-          <p:cNvSpPr>
-            <a:spLocks noGrp="1"/>
-          </p:cNvSpPr>
-          <p:nvPr>
-            <p:ph idx="1"/>
-          </p:nvPr>
-        </p:nvSpPr>
-        <p:spPr/>
-        <p:txBody>
-          <a:bodyPr/>
-          <a:lstStyle/>
-          <a:p>
-            <a:endParaRPr lang="ru-RU" dirty="0"/>
-          </a:p>
-        </p:txBody>
-      </p:sp>
-      <p:sp>
-        <p:nvSpPr>
-          <p:cNvPr id="8" name="Номер слайда 7">
-            <a:extLst>
-              <a:ext uri="{FF2B5EF4-FFF2-40B4-BE49-F238E27FC236}">
-                <a16:creationId xmlns:a16="http://schemas.microsoft.com/office/drawing/2014/main" id="{25CD8033-14E0-4D84-A3FD-0B5AF77F8F78}"/>
-              </a:ext>
-            </a:extLst>
-          </p:cNvPr>
-          <p:cNvSpPr>
-            <a:spLocks noGrp="1"/>
-          </p:cNvSpPr>
-          <p:nvPr>
-            <p:ph type="sldNum" sz="quarter" idx="12"/>
-          </p:nvPr>
-        </p:nvSpPr>
-        <p:spPr/>
-        <p:txBody>
-          <a:bodyPr/>
-          <a:lstStyle/>
-          <a:p>
-            <a:fld id="{02A24B53-BD4C-4445-BAE1-C9D880719956}" type="slidenum">
-              <a:rPr lang="ru-RU" sz="3600" smtClean="0"/>
-              <a:t>6</a:t>
-            </a:fld>
-            <a:endParaRPr lang="ru-RU" sz="2800" dirty="0"/>
-          </a:p>
-        </p:txBody>
-      </p:sp>
-      <p:pic>
-        <p:nvPicPr>
-          <p:cNvPr id="12" name="Рисунок 11">
-            <a:extLst>
-              <a:ext uri="{FF2B5EF4-FFF2-40B4-BE49-F238E27FC236}">
-                <a16:creationId xmlns:a16="http://schemas.microsoft.com/office/drawing/2014/main" id="{FB936A4B-F682-44E4-B153-355DFABE883E}"/>
-              </a:ext>
-            </a:extLst>
-          </p:cNvPr>
-          <p:cNvPicPr>
-            <a:picLocks noChangeAspect="1"/>
-          </p:cNvPicPr>
-          <p:nvPr/>
-        </p:nvPicPr>
-        <p:blipFill>
-          <a:blip r:embed="rId2"/>
-          <a:stretch>
-            <a:fillRect/>
-          </a:stretch>
-        </p:blipFill>
-        <p:spPr>
-          <a:xfrm>
-            <a:off x="112786" y="1066800"/>
-            <a:ext cx="10777997" cy="5031246"/>
-          </a:xfrm>
-          <a:prstGeom prst="rect">
-            <a:avLst/>
-          </a:prstGeom>
-        </p:spPr>
-      </p:pic>
-    </p:spTree>
-    <p:extLst>
-      <p:ext uri="{BB962C8B-B14F-4D97-AF65-F5344CB8AC3E}">
-        <p14:creationId xmlns:p14="http://schemas.microsoft.com/office/powerpoint/2010/main" val="2719750808"/>
-      </p:ext>
-    </p:extLst>
-  </p:cSld>
-  <p:clrMapOvr>
-    <a:masterClrMapping/>
-  </p:clrMapOvr>
-</p:sld>
-</file>
-
-<file path=ppt/slides/slide7.xml><?xml version="1.0" encoding="utf-8"?>
-<p:sld xmlns:a="http://schemas.openxmlformats.org/drawingml/2006/main" xmlns:r="http://schemas.openxmlformats.org/officeDocument/2006/relationships" xmlns:p="http://schemas.openxmlformats.org/presentationml/2006/main">
-  <p:cSld>
-    <p:spTree>
-      <p:nvGrpSpPr>
-        <p:cNvPr id="1" name=""/>
-        <p:cNvGrpSpPr/>
-        <p:nvPr/>
-      </p:nvGrpSpPr>
-      <p:grpSpPr>
-        <a:xfrm>
-          <a:off x="0" y="0"/>
-          <a:ext cx="0" cy="0"/>
-          <a:chOff x="0" y="0"/>
-          <a:chExt cx="0" cy="0"/>
-        </a:xfrm>
-      </p:grpSpPr>
-      <p:sp>
-        <p:nvSpPr>
-          <p:cNvPr id="2" name="Заголовок 1">
-            <a:extLst>
-              <a:ext uri="{FF2B5EF4-FFF2-40B4-BE49-F238E27FC236}">
-                <a16:creationId xmlns:a16="http://schemas.microsoft.com/office/drawing/2014/main" id="{35B9E733-3843-4491-AFD3-BB9BFE05DA7A}"/>
-              </a:ext>
-            </a:extLst>
-          </p:cNvPr>
-          <p:cNvSpPr>
-            <a:spLocks noGrp="1"/>
-          </p:cNvSpPr>
-          <p:nvPr>
-            <p:ph type="title"/>
-          </p:nvPr>
-        </p:nvSpPr>
-        <p:spPr>
-          <a:xfrm>
-            <a:off x="1097280" y="286603"/>
-            <a:ext cx="10058400" cy="359349"/>
-          </a:xfrm>
-        </p:spPr>
-        <p:txBody>
-          <a:bodyPr>
-            <a:noAutofit/>
-          </a:bodyPr>
-          <a:lstStyle/>
-          <a:p>
-            <a:pPr algn="ctr"/>
-            <a:r>
-              <a:rPr lang="ru-RU" sz="4400" dirty="0"/>
-              <a:t>Создание объявлений</a:t>
-            </a:r>
-          </a:p>
-        </p:txBody>
-      </p:sp>
-      <p:sp>
-        <p:nvSpPr>
-          <p:cNvPr id="5" name="Номер слайда 4">
-            <a:extLst>
-              <a:ext uri="{FF2B5EF4-FFF2-40B4-BE49-F238E27FC236}">
-                <a16:creationId xmlns:a16="http://schemas.microsoft.com/office/drawing/2014/main" id="{97F60CE1-AD1A-4674-8682-B99E749022C4}"/>
-              </a:ext>
-            </a:extLst>
-          </p:cNvPr>
-          <p:cNvSpPr>
-            <a:spLocks noGrp="1"/>
-          </p:cNvSpPr>
-          <p:nvPr>
-            <p:ph type="sldNum" sz="quarter" idx="12"/>
-          </p:nvPr>
-        </p:nvSpPr>
-        <p:spPr/>
-        <p:txBody>
-          <a:bodyPr/>
-          <a:lstStyle/>
-          <a:p>
-            <a:fld id="{02A24B53-BD4C-4445-BAE1-C9D880719956}" type="slidenum">
-              <a:rPr lang="ru-RU" sz="3600" smtClean="0"/>
-              <a:t>7</a:t>
-            </a:fld>
-            <a:endParaRPr lang="ru-RU" sz="2800" dirty="0"/>
-          </a:p>
-        </p:txBody>
-      </p:sp>
-      <p:sp>
-        <p:nvSpPr>
-          <p:cNvPr id="6" name="Объект 5">
-            <a:extLst>
-              <a:ext uri="{FF2B5EF4-FFF2-40B4-BE49-F238E27FC236}">
-                <a16:creationId xmlns:a16="http://schemas.microsoft.com/office/drawing/2014/main" id="{A052186F-FFAB-4209-BED5-D15640E9373D}"/>
-              </a:ext>
-            </a:extLst>
-          </p:cNvPr>
-          <p:cNvSpPr>
-            <a:spLocks noGrp="1"/>
-          </p:cNvSpPr>
-          <p:nvPr>
-            <p:ph idx="1"/>
-          </p:nvPr>
-        </p:nvSpPr>
-        <p:spPr/>
-        <p:txBody>
-          <a:bodyPr/>
-          <a:lstStyle/>
-          <a:p>
-            <a:endParaRPr lang="ru-RU"/>
-          </a:p>
-        </p:txBody>
-      </p:sp>
-      <p:pic>
-        <p:nvPicPr>
-          <p:cNvPr id="10" name="Рисунок 9">
-            <a:extLst>
-              <a:ext uri="{FF2B5EF4-FFF2-40B4-BE49-F238E27FC236}">
-                <a16:creationId xmlns:a16="http://schemas.microsoft.com/office/drawing/2014/main" id="{33740913-4193-4271-94F1-88C396F427D5}"/>
-              </a:ext>
-            </a:extLst>
-          </p:cNvPr>
-          <p:cNvPicPr>
-            <a:picLocks noChangeAspect="1"/>
-          </p:cNvPicPr>
-          <p:nvPr/>
-        </p:nvPicPr>
-        <p:blipFill>
-          <a:blip r:embed="rId2"/>
-          <a:stretch>
-            <a:fillRect/>
-          </a:stretch>
-        </p:blipFill>
-        <p:spPr>
-          <a:xfrm>
-            <a:off x="387427" y="1262043"/>
-            <a:ext cx="11133453" cy="4333913"/>
-          </a:xfrm>
-          <a:prstGeom prst="rect">
-            <a:avLst/>
-          </a:prstGeom>
-        </p:spPr>
-      </p:pic>
-    </p:spTree>
-    <p:extLst>
-      <p:ext uri="{BB962C8B-B14F-4D97-AF65-F5344CB8AC3E}">
-        <p14:creationId xmlns:p14="http://schemas.microsoft.com/office/powerpoint/2010/main" val="2039018359"/>
-      </p:ext>
-    </p:extLst>
-  </p:cSld>
-  <p:clrMapOvr>
-    <a:masterClrMapping/>
-  </p:clrMapOvr>
-</p:sld>
-</file>
-
-<file path=ppt/slides/slide8.xml><?xml version="1.0" encoding="utf-8"?>
-<p:sld xmlns:a="http://schemas.openxmlformats.org/drawingml/2006/main" xmlns:r="http://schemas.openxmlformats.org/officeDocument/2006/relationships" xmlns:p="http://schemas.openxmlformats.org/presentationml/2006/main">
-  <p:cSld>
-    <p:spTree>
-      <p:nvGrpSpPr>
-        <p:cNvPr id="1" name=""/>
-        <p:cNvGrpSpPr/>
-        <p:nvPr/>
-      </p:nvGrpSpPr>
-      <p:grpSpPr>
-        <a:xfrm>
-          <a:off x="0" y="0"/>
-          <a:ext cx="0" cy="0"/>
-          <a:chOff x="0" y="0"/>
-          <a:chExt cx="0" cy="0"/>
-        </a:xfrm>
-      </p:grpSpPr>
-      <p:sp>
-        <p:nvSpPr>
-          <p:cNvPr id="2" name="Заголовок 1">
-            <a:extLst>
-              <a:ext uri="{FF2B5EF4-FFF2-40B4-BE49-F238E27FC236}">
                 <a16:creationId xmlns:a16="http://schemas.microsoft.com/office/drawing/2014/main" id="{D729F963-787B-400E-958A-5A9B7F73162C}"/>
               </a:ext>
             </a:extLst>
@@ -7636,13 +6557,20 @@
             <p:ph type="title"/>
           </p:nvPr>
         </p:nvSpPr>
-        <p:spPr/>
-        <p:txBody>
-          <a:bodyPr anchor="t"/>
-          <a:lstStyle/>
-          <a:p>
-            <a:r>
-              <a:rPr lang="ru-RU" dirty="0"/>
+        <p:spPr>
+          <a:xfrm>
+            <a:off x="913795" y="0"/>
+            <a:ext cx="10353762" cy="895350"/>
+          </a:xfrm>
+        </p:spPr>
+        <p:txBody>
+          <a:bodyPr anchor="t">
+            <a:noAutofit/>
+          </a:bodyPr>
+          <a:lstStyle/>
+          <a:p>
+            <a:r>
+              <a:rPr lang="ru-RU" sz="6000" dirty="0"/>
               <a:t>Бизнес-модель</a:t>
             </a:r>
           </a:p>
@@ -7719,7 +6647,7 @@
           <a:p>
             <a:fld id="{02A24B53-BD4C-4445-BAE1-C9D880719956}" type="slidenum">
               <a:rPr lang="ru-RU" sz="3600" smtClean="0"/>
-              <a:t>8</a:t>
+              <a:t>10</a:t>
             </a:fld>
             <a:endParaRPr lang="ru-RU" sz="2800" dirty="0"/>
           </a:p>
@@ -7753,7 +6681,7 @@
           <a:graphicData uri="http://schemas.openxmlformats.org/presentationml/2006/ole">
             <mc:AlternateContent xmlns:mc="http://schemas.openxmlformats.org/markup-compatibility/2006">
               <mc:Choice xmlns:v="urn:schemas-microsoft-com:vml" Requires="v">
-                <p:oleObj spid="_x0000_s1030" r:id="rId3" imgW="3682440" imgH="5015520" progId="">
+                <p:oleObj spid="_x0000_s1034" r:id="rId3" imgW="3682440" imgH="5015520" progId="">
                   <p:embed/>
                 </p:oleObj>
               </mc:Choice>
@@ -7801,6 +6729,2029 @@
 </p:sld>
 </file>
 
+<file path=ppt/slides/slide11.xml><?xml version="1.0" encoding="utf-8"?>
+<p:sld xmlns:a="http://schemas.openxmlformats.org/drawingml/2006/main" xmlns:r="http://schemas.openxmlformats.org/officeDocument/2006/relationships" xmlns:p="http://schemas.openxmlformats.org/presentationml/2006/main">
+  <p:cSld>
+    <p:spTree>
+      <p:nvGrpSpPr>
+        <p:cNvPr id="1" name=""/>
+        <p:cNvGrpSpPr/>
+        <p:nvPr/>
+      </p:nvGrpSpPr>
+      <p:grpSpPr>
+        <a:xfrm>
+          <a:off x="0" y="0"/>
+          <a:ext cx="0" cy="0"/>
+          <a:chOff x="0" y="0"/>
+          <a:chExt cx="0" cy="0"/>
+        </a:xfrm>
+      </p:grpSpPr>
+      <p:sp>
+        <p:nvSpPr>
+          <p:cNvPr id="2" name="Заголовок 1">
+            <a:extLst>
+              <a:ext uri="{FF2B5EF4-FFF2-40B4-BE49-F238E27FC236}">
+                <a16:creationId xmlns:a16="http://schemas.microsoft.com/office/drawing/2014/main" id="{AE909BBB-6F23-4909-B443-320B9F877695}"/>
+              </a:ext>
+            </a:extLst>
+          </p:cNvPr>
+          <p:cNvSpPr>
+            <a:spLocks noGrp="1"/>
+          </p:cNvSpPr>
+          <p:nvPr>
+            <p:ph type="title"/>
+          </p:nvPr>
+        </p:nvSpPr>
+        <p:spPr>
+          <a:xfrm>
+            <a:off x="1097280" y="0"/>
+            <a:ext cx="10058400" cy="885825"/>
+          </a:xfrm>
+        </p:spPr>
+        <p:txBody>
+          <a:bodyPr>
+            <a:noAutofit/>
+          </a:bodyPr>
+          <a:lstStyle/>
+          <a:p>
+            <a:pPr algn="ctr"/>
+            <a:r>
+              <a:rPr lang="ru-RU" sz="6000" dirty="0"/>
+              <a:t>Планы на будущее</a:t>
+            </a:r>
+          </a:p>
+        </p:txBody>
+      </p:sp>
+      <p:sp>
+        <p:nvSpPr>
+          <p:cNvPr id="5" name="Объект 4">
+            <a:extLst>
+              <a:ext uri="{FF2B5EF4-FFF2-40B4-BE49-F238E27FC236}">
+                <a16:creationId xmlns:a16="http://schemas.microsoft.com/office/drawing/2014/main" id="{76823D56-EE99-4D32-881F-10AA9FB9271B}"/>
+              </a:ext>
+            </a:extLst>
+          </p:cNvPr>
+          <p:cNvSpPr>
+            <a:spLocks noGrp="1"/>
+          </p:cNvSpPr>
+          <p:nvPr>
+            <p:ph idx="1"/>
+          </p:nvPr>
+        </p:nvSpPr>
+        <p:spPr/>
+        <p:txBody>
+          <a:bodyPr>
+            <a:normAutofit/>
+          </a:bodyPr>
+          <a:lstStyle/>
+          <a:p>
+            <a:r>
+              <a:rPr lang="ru-RU" sz="4000" dirty="0" err="1"/>
+              <a:t>Подсайты</a:t>
+            </a:r>
+            <a:r>
+              <a:rPr lang="ru-RU" sz="4000" dirty="0"/>
+              <a:t> для тематик</a:t>
+            </a:r>
+          </a:p>
+          <a:p>
+            <a:r>
+              <a:rPr lang="ru-RU" sz="4000" dirty="0"/>
+              <a:t>Улучшить систему тэгов</a:t>
+            </a:r>
+          </a:p>
+          <a:p>
+            <a:r>
+              <a:rPr lang="ru-RU" sz="4000" dirty="0"/>
+              <a:t>Улучшение пользовательского опыта на основе обратной связи</a:t>
+            </a:r>
+          </a:p>
+          <a:p>
+            <a:r>
+              <a:rPr lang="ru-RU" sz="4000" dirty="0"/>
+              <a:t>Подписка</a:t>
+            </a:r>
+          </a:p>
+        </p:txBody>
+      </p:sp>
+      <p:sp>
+        <p:nvSpPr>
+          <p:cNvPr id="7" name="Номер слайда 6">
+            <a:extLst>
+              <a:ext uri="{FF2B5EF4-FFF2-40B4-BE49-F238E27FC236}">
+                <a16:creationId xmlns:a16="http://schemas.microsoft.com/office/drawing/2014/main" id="{B72953A7-FF72-4643-9A2C-AF252CB07956}"/>
+              </a:ext>
+            </a:extLst>
+          </p:cNvPr>
+          <p:cNvSpPr>
+            <a:spLocks noGrp="1"/>
+          </p:cNvSpPr>
+          <p:nvPr>
+            <p:ph type="sldNum" sz="quarter" idx="12"/>
+          </p:nvPr>
+        </p:nvSpPr>
+        <p:spPr/>
+        <p:txBody>
+          <a:bodyPr/>
+          <a:lstStyle/>
+          <a:p>
+            <a:fld id="{02A24B53-BD4C-4445-BAE1-C9D880719956}" type="slidenum">
+              <a:rPr lang="ru-RU" sz="3600" smtClean="0"/>
+              <a:t>11</a:t>
+            </a:fld>
+            <a:endParaRPr lang="ru-RU" sz="2800" dirty="0"/>
+          </a:p>
+        </p:txBody>
+      </p:sp>
+    </p:spTree>
+    <p:extLst>
+      <p:ext uri="{BB962C8B-B14F-4D97-AF65-F5344CB8AC3E}">
+        <p14:creationId xmlns:p14="http://schemas.microsoft.com/office/powerpoint/2010/main" val="1332642169"/>
+      </p:ext>
+    </p:extLst>
+  </p:cSld>
+  <p:clrMapOvr>
+    <a:masterClrMapping/>
+  </p:clrMapOvr>
+</p:sld>
+</file>
+
+<file path=ppt/slides/slide12.xml><?xml version="1.0" encoding="utf-8"?>
+<p:sld xmlns:a="http://schemas.openxmlformats.org/drawingml/2006/main" xmlns:r="http://schemas.openxmlformats.org/officeDocument/2006/relationships" xmlns:p="http://schemas.openxmlformats.org/presentationml/2006/main">
+  <p:cSld>
+    <p:spTree>
+      <p:nvGrpSpPr>
+        <p:cNvPr id="1" name=""/>
+        <p:cNvGrpSpPr/>
+        <p:nvPr/>
+      </p:nvGrpSpPr>
+      <p:grpSpPr>
+        <a:xfrm>
+          <a:off x="0" y="0"/>
+          <a:ext cx="0" cy="0"/>
+          <a:chOff x="0" y="0"/>
+          <a:chExt cx="0" cy="0"/>
+        </a:xfrm>
+      </p:grpSpPr>
+      <p:sp>
+        <p:nvSpPr>
+          <p:cNvPr id="2" name="Заголовок 1">
+            <a:extLst>
+              <a:ext uri="{FF2B5EF4-FFF2-40B4-BE49-F238E27FC236}">
+                <a16:creationId xmlns:a16="http://schemas.microsoft.com/office/drawing/2014/main" id="{1E288B05-1367-4C5D-84AD-794CB02CD9D6}"/>
+              </a:ext>
+            </a:extLst>
+          </p:cNvPr>
+          <p:cNvSpPr>
+            <a:spLocks noGrp="1"/>
+          </p:cNvSpPr>
+          <p:nvPr>
+            <p:ph type="title"/>
+          </p:nvPr>
+        </p:nvSpPr>
+        <p:spPr>
+          <a:xfrm>
+            <a:off x="578806" y="609600"/>
+            <a:ext cx="11023739" cy="970450"/>
+          </a:xfrm>
+        </p:spPr>
+        <p:txBody>
+          <a:bodyPr anchor="t">
+            <a:noAutofit/>
+          </a:bodyPr>
+          <a:lstStyle/>
+          <a:p>
+            <a:pPr algn="ctr"/>
+            <a:r>
+              <a:rPr lang="ru-RU" dirty="0"/>
+              <a:t>Благодарят вас за внимание члены команды:</a:t>
+            </a:r>
+          </a:p>
+        </p:txBody>
+      </p:sp>
+      <p:sp>
+        <p:nvSpPr>
+          <p:cNvPr id="3" name="Объект 2">
+            <a:extLst>
+              <a:ext uri="{FF2B5EF4-FFF2-40B4-BE49-F238E27FC236}">
+                <a16:creationId xmlns:a16="http://schemas.microsoft.com/office/drawing/2014/main" id="{B36FE170-15E3-40E6-951F-19D58B2D73EE}"/>
+              </a:ext>
+            </a:extLst>
+          </p:cNvPr>
+          <p:cNvSpPr>
+            <a:spLocks noGrp="1"/>
+          </p:cNvSpPr>
+          <p:nvPr>
+            <p:ph idx="1"/>
+          </p:nvPr>
+        </p:nvSpPr>
+        <p:spPr/>
+        <p:txBody>
+          <a:bodyPr>
+            <a:normAutofit/>
+          </a:bodyPr>
+          <a:lstStyle/>
+          <a:p>
+            <a:r>
+              <a:rPr lang="ru-RU" sz="3200" dirty="0"/>
+              <a:t>Винокуров Владислав Александрович – </a:t>
+            </a:r>
+            <a:r>
+              <a:rPr lang="en-US" sz="3200" dirty="0"/>
+              <a:t>backend</a:t>
+            </a:r>
+            <a:r>
+              <a:rPr lang="ru-RU" sz="3200" dirty="0"/>
+              <a:t> разработчик</a:t>
+            </a:r>
+          </a:p>
+          <a:p>
+            <a:endParaRPr lang="ru-RU" sz="3200" dirty="0"/>
+          </a:p>
+          <a:p>
+            <a:r>
+              <a:rPr lang="ru-RU" sz="3200" dirty="0"/>
+              <a:t>Шевченко Даниил Юрьевич – </a:t>
+            </a:r>
+            <a:r>
+              <a:rPr lang="en-US" sz="3200" dirty="0"/>
+              <a:t>frontend  </a:t>
+            </a:r>
+            <a:r>
+              <a:rPr lang="ru-RU" sz="3200" dirty="0"/>
+              <a:t>разработчик, дизайнер</a:t>
+            </a:r>
+          </a:p>
+        </p:txBody>
+      </p:sp>
+      <p:sp>
+        <p:nvSpPr>
+          <p:cNvPr id="5" name="Номер слайда 4">
+            <a:extLst>
+              <a:ext uri="{FF2B5EF4-FFF2-40B4-BE49-F238E27FC236}">
+                <a16:creationId xmlns:a16="http://schemas.microsoft.com/office/drawing/2014/main" id="{85E9646B-A5D9-4D6E-868F-1798C1B5A5DE}"/>
+              </a:ext>
+            </a:extLst>
+          </p:cNvPr>
+          <p:cNvSpPr>
+            <a:spLocks noGrp="1"/>
+          </p:cNvSpPr>
+          <p:nvPr>
+            <p:ph type="sldNum" sz="quarter" idx="12"/>
+          </p:nvPr>
+        </p:nvSpPr>
+        <p:spPr/>
+        <p:txBody>
+          <a:bodyPr/>
+          <a:lstStyle/>
+          <a:p>
+            <a:fld id="{02A24B53-BD4C-4445-BAE1-C9D880719956}" type="slidenum">
+              <a:rPr lang="ru-RU" sz="3600" smtClean="0"/>
+              <a:t>12</a:t>
+            </a:fld>
+            <a:endParaRPr lang="ru-RU" sz="2800" dirty="0"/>
+          </a:p>
+        </p:txBody>
+      </p:sp>
+      <p:pic>
+        <p:nvPicPr>
+          <p:cNvPr id="6" name="Рисунок 5">
+            <a:extLst>
+              <a:ext uri="{FF2B5EF4-FFF2-40B4-BE49-F238E27FC236}">
+                <a16:creationId xmlns:a16="http://schemas.microsoft.com/office/drawing/2014/main" id="{54DF6568-AB3F-49E3-8F6A-A50D007A4C43}"/>
+              </a:ext>
+            </a:extLst>
+          </p:cNvPr>
+          <p:cNvPicPr/>
+          <p:nvPr/>
+        </p:nvPicPr>
+        <p:blipFill>
+          <a:blip r:embed="rId2" cstate="print">
+            <a:extLst>
+              <a:ext uri="{28A0092B-C50C-407E-A947-70E740481C1C}">
+                <a14:useLocalDpi xmlns:a14="http://schemas.microsoft.com/office/drawing/2010/main" val="0"/>
+              </a:ext>
+            </a:extLst>
+          </a:blip>
+          <a:srcRect/>
+          <a:stretch>
+            <a:fillRect/>
+          </a:stretch>
+        </p:blipFill>
+        <p:spPr bwMode="auto">
+          <a:xfrm>
+            <a:off x="7596580" y="4451408"/>
+            <a:ext cx="2259784" cy="2259784"/>
+          </a:xfrm>
+          <a:prstGeom prst="rect">
+            <a:avLst/>
+          </a:prstGeom>
+          <a:noFill/>
+          <a:ln>
+            <a:noFill/>
+          </a:ln>
+        </p:spPr>
+      </p:pic>
+    </p:spTree>
+    <p:extLst>
+      <p:ext uri="{BB962C8B-B14F-4D97-AF65-F5344CB8AC3E}">
+        <p14:creationId xmlns:p14="http://schemas.microsoft.com/office/powerpoint/2010/main" val="3653499641"/>
+      </p:ext>
+    </p:extLst>
+  </p:cSld>
+  <p:clrMapOvr>
+    <a:masterClrMapping/>
+  </p:clrMapOvr>
+</p:sld>
+</file>
+
+<file path=ppt/slides/slide2.xml><?xml version="1.0" encoding="utf-8"?>
+<p:sld xmlns:a="http://schemas.openxmlformats.org/drawingml/2006/main" xmlns:r="http://schemas.openxmlformats.org/officeDocument/2006/relationships" xmlns:p="http://schemas.openxmlformats.org/presentationml/2006/main">
+  <p:cSld>
+    <p:spTree>
+      <p:nvGrpSpPr>
+        <p:cNvPr id="1" name=""/>
+        <p:cNvGrpSpPr/>
+        <p:nvPr/>
+      </p:nvGrpSpPr>
+      <p:grpSpPr>
+        <a:xfrm>
+          <a:off x="0" y="0"/>
+          <a:ext cx="0" cy="0"/>
+          <a:chOff x="0" y="0"/>
+          <a:chExt cx="0" cy="0"/>
+        </a:xfrm>
+      </p:grpSpPr>
+      <p:sp>
+        <p:nvSpPr>
+          <p:cNvPr id="2" name="Заголовок 1">
+            <a:extLst>
+              <a:ext uri="{FF2B5EF4-FFF2-40B4-BE49-F238E27FC236}">
+                <a16:creationId xmlns:a16="http://schemas.microsoft.com/office/drawing/2014/main" id="{E183D320-83D6-4D81-835C-90876FA421A5}"/>
+              </a:ext>
+            </a:extLst>
+          </p:cNvPr>
+          <p:cNvSpPr>
+            <a:spLocks noGrp="1"/>
+          </p:cNvSpPr>
+          <p:nvPr>
+            <p:ph type="title"/>
+          </p:nvPr>
+        </p:nvSpPr>
+        <p:spPr>
+          <a:xfrm>
+            <a:off x="1249680" y="0"/>
+            <a:ext cx="9692640" cy="1828800"/>
+          </a:xfrm>
+        </p:spPr>
+        <p:txBody>
+          <a:bodyPr anchor="t">
+            <a:normAutofit/>
+          </a:bodyPr>
+          <a:lstStyle/>
+          <a:p>
+            <a:r>
+              <a:rPr lang="ru-RU" sz="6000" dirty="0"/>
+              <a:t>Введение</a:t>
+            </a:r>
+          </a:p>
+        </p:txBody>
+      </p:sp>
+      <p:sp>
+        <p:nvSpPr>
+          <p:cNvPr id="3" name="Объект 2">
+            <a:extLst>
+              <a:ext uri="{FF2B5EF4-FFF2-40B4-BE49-F238E27FC236}">
+                <a16:creationId xmlns:a16="http://schemas.microsoft.com/office/drawing/2014/main" id="{3CA0E137-F6D9-4561-A25C-EBB3EF168510}"/>
+              </a:ext>
+            </a:extLst>
+          </p:cNvPr>
+          <p:cNvSpPr>
+            <a:spLocks noGrp="1"/>
+          </p:cNvSpPr>
+          <p:nvPr>
+            <p:ph idx="1"/>
+          </p:nvPr>
+        </p:nvSpPr>
+        <p:spPr>
+          <a:xfrm>
+            <a:off x="1249680" y="1828800"/>
+            <a:ext cx="8595360" cy="3512438"/>
+          </a:xfrm>
+        </p:spPr>
+        <p:txBody>
+          <a:bodyPr>
+            <a:normAutofit/>
+          </a:bodyPr>
+          <a:lstStyle/>
+          <a:p>
+            <a:r>
+              <a:rPr lang="ru-RU" sz="3200" dirty="0"/>
+              <a:t>Многие сайты посвящены продаже</a:t>
+            </a:r>
+          </a:p>
+          <a:p>
+            <a:r>
+              <a:rPr lang="ru-RU" sz="3200" dirty="0"/>
+              <a:t>Малое количество профильных сайтов в России</a:t>
+            </a:r>
+          </a:p>
+          <a:p>
+            <a:r>
+              <a:rPr lang="ru-RU" sz="3200" dirty="0"/>
+              <a:t>Растущий спрос в последние 3 года</a:t>
+            </a:r>
+          </a:p>
+          <a:p>
+            <a:endParaRPr lang="ru-RU" sz="3200" dirty="0"/>
+          </a:p>
+        </p:txBody>
+      </p:sp>
+      <p:sp>
+        <p:nvSpPr>
+          <p:cNvPr id="5" name="Номер слайда 4">
+            <a:extLst>
+              <a:ext uri="{FF2B5EF4-FFF2-40B4-BE49-F238E27FC236}">
+                <a16:creationId xmlns:a16="http://schemas.microsoft.com/office/drawing/2014/main" id="{F4B61EFF-71A7-4077-B61C-F66F0949A071}"/>
+              </a:ext>
+            </a:extLst>
+          </p:cNvPr>
+          <p:cNvSpPr>
+            <a:spLocks noGrp="1"/>
+          </p:cNvSpPr>
+          <p:nvPr>
+            <p:ph type="sldNum" sz="quarter" idx="12"/>
+          </p:nvPr>
+        </p:nvSpPr>
+        <p:spPr/>
+        <p:txBody>
+          <a:bodyPr/>
+          <a:lstStyle/>
+          <a:p>
+            <a:fld id="{02A24B53-BD4C-4445-BAE1-C9D880719956}" type="slidenum">
+              <a:rPr lang="ru-RU" sz="3600" smtClean="0"/>
+              <a:t>2</a:t>
+            </a:fld>
+            <a:endParaRPr lang="ru-RU" sz="2800" dirty="0"/>
+          </a:p>
+        </p:txBody>
+      </p:sp>
+      <p:pic>
+        <p:nvPicPr>
+          <p:cNvPr id="6" name="Рисунок 5">
+            <a:extLst>
+              <a:ext uri="{FF2B5EF4-FFF2-40B4-BE49-F238E27FC236}">
+                <a16:creationId xmlns:a16="http://schemas.microsoft.com/office/drawing/2014/main" id="{BA8111FC-44BE-42D6-B67A-BCA2145C9F39}"/>
+              </a:ext>
+            </a:extLst>
+          </p:cNvPr>
+          <p:cNvPicPr>
+            <a:picLocks noChangeAspect="1"/>
+          </p:cNvPicPr>
+          <p:nvPr/>
+        </p:nvPicPr>
+        <p:blipFill>
+          <a:blip r:embed="rId2"/>
+          <a:stretch>
+            <a:fillRect/>
+          </a:stretch>
+        </p:blipFill>
+        <p:spPr>
+          <a:xfrm>
+            <a:off x="288488" y="4270619"/>
+            <a:ext cx="10558477" cy="2343477"/>
+          </a:xfrm>
+          <a:prstGeom prst="rect">
+            <a:avLst/>
+          </a:prstGeom>
+        </p:spPr>
+      </p:pic>
+    </p:spTree>
+    <p:extLst>
+      <p:ext uri="{BB962C8B-B14F-4D97-AF65-F5344CB8AC3E}">
+        <p14:creationId xmlns:p14="http://schemas.microsoft.com/office/powerpoint/2010/main" val="2068369394"/>
+      </p:ext>
+    </p:extLst>
+  </p:cSld>
+  <p:clrMapOvr>
+    <a:masterClrMapping/>
+  </p:clrMapOvr>
+</p:sld>
+</file>
+
+<file path=ppt/slides/slide3.xml><?xml version="1.0" encoding="utf-8"?>
+<p:sld xmlns:a="http://schemas.openxmlformats.org/drawingml/2006/main" xmlns:r="http://schemas.openxmlformats.org/officeDocument/2006/relationships" xmlns:p="http://schemas.openxmlformats.org/presentationml/2006/main">
+  <p:cSld>
+    <p:spTree>
+      <p:nvGrpSpPr>
+        <p:cNvPr id="1" name=""/>
+        <p:cNvGrpSpPr/>
+        <p:nvPr/>
+      </p:nvGrpSpPr>
+      <p:grpSpPr>
+        <a:xfrm>
+          <a:off x="0" y="0"/>
+          <a:ext cx="0" cy="0"/>
+          <a:chOff x="0" y="0"/>
+          <a:chExt cx="0" cy="0"/>
+        </a:xfrm>
+      </p:grpSpPr>
+      <p:sp>
+        <p:nvSpPr>
+          <p:cNvPr id="2" name="Заголовок 1">
+            <a:extLst>
+              <a:ext uri="{FF2B5EF4-FFF2-40B4-BE49-F238E27FC236}">
+                <a16:creationId xmlns:a16="http://schemas.microsoft.com/office/drawing/2014/main" id="{216E6AF0-19CF-424C-B6F7-5E7304E637EA}"/>
+              </a:ext>
+            </a:extLst>
+          </p:cNvPr>
+          <p:cNvSpPr>
+            <a:spLocks noGrp="1"/>
+          </p:cNvSpPr>
+          <p:nvPr>
+            <p:ph type="title"/>
+          </p:nvPr>
+        </p:nvSpPr>
+        <p:spPr>
+          <a:xfrm>
+            <a:off x="913795" y="0"/>
+            <a:ext cx="10353762" cy="1098958"/>
+          </a:xfrm>
+        </p:spPr>
+        <p:txBody>
+          <a:bodyPr anchor="t">
+            <a:noAutofit/>
+          </a:bodyPr>
+          <a:lstStyle/>
+          <a:p>
+            <a:r>
+              <a:rPr lang="ru-RU" sz="6000" dirty="0"/>
+              <a:t>Перспективы через 8 лет</a:t>
+            </a:r>
+          </a:p>
+        </p:txBody>
+      </p:sp>
+      <p:pic>
+        <p:nvPicPr>
+          <p:cNvPr id="6" name="Объект 5">
+            <a:extLst>
+              <a:ext uri="{FF2B5EF4-FFF2-40B4-BE49-F238E27FC236}">
+                <a16:creationId xmlns:a16="http://schemas.microsoft.com/office/drawing/2014/main" id="{FD363FA3-6900-49A0-A0AA-374484E012A8}"/>
+              </a:ext>
+            </a:extLst>
+          </p:cNvPr>
+          <p:cNvPicPr>
+            <a:picLocks noGrp="1" noChangeAspect="1"/>
+          </p:cNvPicPr>
+          <p:nvPr>
+            <p:ph idx="1"/>
+          </p:nvPr>
+        </p:nvPicPr>
+        <p:blipFill>
+          <a:blip r:embed="rId2">
+            <a:extLst>
+              <a:ext uri="{28A0092B-C50C-407E-A947-70E740481C1C}">
+                <a14:useLocalDpi xmlns:a14="http://schemas.microsoft.com/office/drawing/2010/main" val="0"/>
+              </a:ext>
+            </a:extLst>
+          </a:blip>
+          <a:stretch>
+            <a:fillRect/>
+          </a:stretch>
+        </p:blipFill>
+        <p:spPr>
+          <a:xfrm>
+            <a:off x="2768333" y="1330045"/>
+            <a:ext cx="6644686" cy="5227446"/>
+          </a:xfrm>
+        </p:spPr>
+      </p:pic>
+      <p:sp>
+        <p:nvSpPr>
+          <p:cNvPr id="4" name="Номер слайда 3">
+            <a:extLst>
+              <a:ext uri="{FF2B5EF4-FFF2-40B4-BE49-F238E27FC236}">
+                <a16:creationId xmlns:a16="http://schemas.microsoft.com/office/drawing/2014/main" id="{D5A24EA9-8062-4FDC-A748-ECADE9B53492}"/>
+              </a:ext>
+            </a:extLst>
+          </p:cNvPr>
+          <p:cNvSpPr>
+            <a:spLocks noGrp="1"/>
+          </p:cNvSpPr>
+          <p:nvPr>
+            <p:ph type="sldNum" sz="quarter" idx="12"/>
+          </p:nvPr>
+        </p:nvSpPr>
+        <p:spPr/>
+        <p:txBody>
+          <a:bodyPr/>
+          <a:lstStyle/>
+          <a:p>
+            <a:fld id="{02A24B53-BD4C-4445-BAE1-C9D880719956}" type="slidenum">
+              <a:rPr lang="ru-RU" sz="3600" smtClean="0"/>
+              <a:t>3</a:t>
+            </a:fld>
+            <a:endParaRPr lang="ru-RU" sz="3600" dirty="0"/>
+          </a:p>
+        </p:txBody>
+      </p:sp>
+      <p:sp>
+        <p:nvSpPr>
+          <p:cNvPr id="7" name="TextBox 6">
+            <a:extLst>
+              <a:ext uri="{FF2B5EF4-FFF2-40B4-BE49-F238E27FC236}">
+                <a16:creationId xmlns:a16="http://schemas.microsoft.com/office/drawing/2014/main" id="{E5C6901B-9310-4641-9FB5-8580A5A2F065}"/>
+              </a:ext>
+            </a:extLst>
+          </p:cNvPr>
+          <p:cNvSpPr txBox="1"/>
+          <p:nvPr/>
+        </p:nvSpPr>
+        <p:spPr>
+          <a:xfrm>
+            <a:off x="0" y="6550223"/>
+            <a:ext cx="6857134" cy="307777"/>
+          </a:xfrm>
+          <a:prstGeom prst="rect">
+            <a:avLst/>
+          </a:prstGeom>
+          <a:noFill/>
+        </p:spPr>
+        <p:txBody>
+          <a:bodyPr wrap="none" rtlCol="0">
+            <a:spAutoFit/>
+          </a:bodyPr>
+          <a:lstStyle/>
+          <a:p>
+            <a:r>
+              <a:rPr lang="en-US" sz="1400" dirty="0"/>
+              <a:t>https://www.businessresearchinsights.com/market-reports/trading-card-market-102964</a:t>
+            </a:r>
+            <a:endParaRPr lang="ru-RU" sz="1400" dirty="0"/>
+          </a:p>
+        </p:txBody>
+      </p:sp>
+    </p:spTree>
+    <p:extLst>
+      <p:ext uri="{BB962C8B-B14F-4D97-AF65-F5344CB8AC3E}">
+        <p14:creationId xmlns:p14="http://schemas.microsoft.com/office/powerpoint/2010/main" val="2367829832"/>
+      </p:ext>
+    </p:extLst>
+  </p:cSld>
+  <p:clrMapOvr>
+    <a:masterClrMapping/>
+  </p:clrMapOvr>
+</p:sld>
+</file>
+
+<file path=ppt/slides/slide4.xml><?xml version="1.0" encoding="utf-8"?>
+<p:sld xmlns:a="http://schemas.openxmlformats.org/drawingml/2006/main" xmlns:r="http://schemas.openxmlformats.org/officeDocument/2006/relationships" xmlns:p="http://schemas.openxmlformats.org/presentationml/2006/main">
+  <p:cSld>
+    <p:spTree>
+      <p:nvGrpSpPr>
+        <p:cNvPr id="1" name=""/>
+        <p:cNvGrpSpPr/>
+        <p:nvPr/>
+      </p:nvGrpSpPr>
+      <p:grpSpPr>
+        <a:xfrm>
+          <a:off x="0" y="0"/>
+          <a:ext cx="0" cy="0"/>
+          <a:chOff x="0" y="0"/>
+          <a:chExt cx="0" cy="0"/>
+        </a:xfrm>
+      </p:grpSpPr>
+      <p:sp>
+        <p:nvSpPr>
+          <p:cNvPr id="2" name="Заголовок 1">
+            <a:extLst>
+              <a:ext uri="{FF2B5EF4-FFF2-40B4-BE49-F238E27FC236}">
+                <a16:creationId xmlns:a16="http://schemas.microsoft.com/office/drawing/2014/main" id="{F1166004-2872-4A26-98F4-7B8B2D134377}"/>
+              </a:ext>
+            </a:extLst>
+          </p:cNvPr>
+          <p:cNvSpPr>
+            <a:spLocks noGrp="1"/>
+          </p:cNvSpPr>
+          <p:nvPr>
+            <p:ph type="title"/>
+          </p:nvPr>
+        </p:nvSpPr>
+        <p:spPr>
+          <a:xfrm>
+            <a:off x="913795" y="0"/>
+            <a:ext cx="10353762" cy="1051134"/>
+          </a:xfrm>
+        </p:spPr>
+        <p:txBody>
+          <a:bodyPr anchor="t">
+            <a:normAutofit/>
+          </a:bodyPr>
+          <a:lstStyle/>
+          <a:p>
+            <a:pPr algn="ctr"/>
+            <a:r>
+              <a:rPr lang="ru-RU" sz="6000" dirty="0"/>
+              <a:t>Предлагаемое решение</a:t>
+            </a:r>
+          </a:p>
+        </p:txBody>
+      </p:sp>
+      <p:sp>
+        <p:nvSpPr>
+          <p:cNvPr id="3" name="Объект 2">
+            <a:extLst>
+              <a:ext uri="{FF2B5EF4-FFF2-40B4-BE49-F238E27FC236}">
+                <a16:creationId xmlns:a16="http://schemas.microsoft.com/office/drawing/2014/main" id="{97C7B70D-867B-4ECC-868E-A661127A7C7D}"/>
+              </a:ext>
+            </a:extLst>
+          </p:cNvPr>
+          <p:cNvSpPr>
+            <a:spLocks noGrp="1"/>
+          </p:cNvSpPr>
+          <p:nvPr>
+            <p:ph idx="1"/>
+          </p:nvPr>
+        </p:nvSpPr>
+        <p:spPr>
+          <a:xfrm>
+            <a:off x="1810512" y="3212984"/>
+            <a:ext cx="8595360" cy="4351337"/>
+          </a:xfrm>
+        </p:spPr>
+        <p:txBody>
+          <a:bodyPr>
+            <a:normAutofit/>
+          </a:bodyPr>
+          <a:lstStyle/>
+          <a:p>
+            <a:pPr marL="0" indent="0" algn="ctr">
+              <a:buNone/>
+            </a:pPr>
+            <a:r>
+              <a:rPr lang="ru-RU" sz="4000" dirty="0"/>
+              <a:t>Веб-приложение </a:t>
+            </a:r>
+            <a:r>
+              <a:rPr lang="en-US" sz="4000" dirty="0"/>
+              <a:t>Card Trader </a:t>
+            </a:r>
+            <a:r>
+              <a:rPr lang="ru-RU" sz="4000" dirty="0"/>
+              <a:t>для обмена коллекционными карточками и наборами</a:t>
+            </a:r>
+          </a:p>
+        </p:txBody>
+      </p:sp>
+      <p:pic>
+        <p:nvPicPr>
+          <p:cNvPr id="5" name="Рисунок 4">
+            <a:extLst>
+              <a:ext uri="{FF2B5EF4-FFF2-40B4-BE49-F238E27FC236}">
+                <a16:creationId xmlns:a16="http://schemas.microsoft.com/office/drawing/2014/main" id="{0159BED2-E656-4B4A-BFAA-F77CA3D3D6F6}"/>
+              </a:ext>
+            </a:extLst>
+          </p:cNvPr>
+          <p:cNvPicPr>
+            <a:picLocks noChangeAspect="1"/>
+          </p:cNvPicPr>
+          <p:nvPr/>
+        </p:nvPicPr>
+        <p:blipFill>
+          <a:blip r:embed="rId2">
+            <a:extLst>
+              <a:ext uri="{28A0092B-C50C-407E-A947-70E740481C1C}">
+                <a14:useLocalDpi xmlns:a14="http://schemas.microsoft.com/office/drawing/2010/main" val="0"/>
+              </a:ext>
+            </a:extLst>
+          </a:blip>
+          <a:stretch>
+            <a:fillRect/>
+          </a:stretch>
+        </p:blipFill>
+        <p:spPr>
+          <a:xfrm>
+            <a:off x="2017680" y="-2909096"/>
+            <a:ext cx="8145991" cy="10473417"/>
+          </a:xfrm>
+          <a:prstGeom prst="rect">
+            <a:avLst/>
+          </a:prstGeom>
+        </p:spPr>
+      </p:pic>
+      <p:sp>
+        <p:nvSpPr>
+          <p:cNvPr id="7" name="Номер слайда 6">
+            <a:extLst>
+              <a:ext uri="{FF2B5EF4-FFF2-40B4-BE49-F238E27FC236}">
+                <a16:creationId xmlns:a16="http://schemas.microsoft.com/office/drawing/2014/main" id="{A0E79290-1BFB-4616-A592-2975C6C157A1}"/>
+              </a:ext>
+            </a:extLst>
+          </p:cNvPr>
+          <p:cNvSpPr>
+            <a:spLocks noGrp="1"/>
+          </p:cNvSpPr>
+          <p:nvPr>
+            <p:ph type="sldNum" sz="quarter" idx="12"/>
+          </p:nvPr>
+        </p:nvSpPr>
+        <p:spPr/>
+        <p:txBody>
+          <a:bodyPr/>
+          <a:lstStyle/>
+          <a:p>
+            <a:fld id="{02A24B53-BD4C-4445-BAE1-C9D880719956}" type="slidenum">
+              <a:rPr lang="ru-RU" sz="3600" smtClean="0"/>
+              <a:t>4</a:t>
+            </a:fld>
+            <a:endParaRPr lang="ru-RU" sz="2800" dirty="0"/>
+          </a:p>
+        </p:txBody>
+      </p:sp>
+    </p:spTree>
+    <p:extLst>
+      <p:ext uri="{BB962C8B-B14F-4D97-AF65-F5344CB8AC3E}">
+        <p14:creationId xmlns:p14="http://schemas.microsoft.com/office/powerpoint/2010/main" val="3460240273"/>
+      </p:ext>
+    </p:extLst>
+  </p:cSld>
+  <p:clrMapOvr>
+    <a:masterClrMapping/>
+  </p:clrMapOvr>
+</p:sld>
+</file>
+
+<file path=ppt/slides/slide5.xml><?xml version="1.0" encoding="utf-8"?>
+<p:sld xmlns:a="http://schemas.openxmlformats.org/drawingml/2006/main" xmlns:r="http://schemas.openxmlformats.org/officeDocument/2006/relationships" xmlns:p="http://schemas.openxmlformats.org/presentationml/2006/main">
+  <p:cSld>
+    <p:spTree>
+      <p:nvGrpSpPr>
+        <p:cNvPr id="1" name=""/>
+        <p:cNvGrpSpPr/>
+        <p:nvPr/>
+      </p:nvGrpSpPr>
+      <p:grpSpPr>
+        <a:xfrm>
+          <a:off x="0" y="0"/>
+          <a:ext cx="0" cy="0"/>
+          <a:chOff x="0" y="0"/>
+          <a:chExt cx="0" cy="0"/>
+        </a:xfrm>
+      </p:grpSpPr>
+      <p:sp>
+        <p:nvSpPr>
+          <p:cNvPr id="2" name="Заголовок 1">
+            <a:extLst>
+              <a:ext uri="{FF2B5EF4-FFF2-40B4-BE49-F238E27FC236}">
+                <a16:creationId xmlns:a16="http://schemas.microsoft.com/office/drawing/2014/main" id="{9F160AFA-F51A-4B3C-9066-00CFC43A23AA}"/>
+              </a:ext>
+            </a:extLst>
+          </p:cNvPr>
+          <p:cNvSpPr>
+            <a:spLocks noGrp="1"/>
+          </p:cNvSpPr>
+          <p:nvPr>
+            <p:ph type="title"/>
+          </p:nvPr>
+        </p:nvSpPr>
+        <p:spPr>
+          <a:xfrm>
+            <a:off x="725754" y="0"/>
+            <a:ext cx="10740492" cy="903287"/>
+          </a:xfrm>
+        </p:spPr>
+        <p:txBody>
+          <a:bodyPr>
+            <a:noAutofit/>
+          </a:bodyPr>
+          <a:lstStyle/>
+          <a:p>
+            <a:pPr algn="ctr"/>
+            <a:r>
+              <a:rPr lang="ru-RU" sz="6000" dirty="0"/>
+              <a:t>Конкурентное преимущество</a:t>
+            </a:r>
+          </a:p>
+        </p:txBody>
+      </p:sp>
+      <p:sp>
+        <p:nvSpPr>
+          <p:cNvPr id="24" name="Номер слайда 23">
+            <a:extLst>
+              <a:ext uri="{FF2B5EF4-FFF2-40B4-BE49-F238E27FC236}">
+                <a16:creationId xmlns:a16="http://schemas.microsoft.com/office/drawing/2014/main" id="{A044B873-A0E0-432C-BB3A-6CA63FBFA2A5}"/>
+              </a:ext>
+            </a:extLst>
+          </p:cNvPr>
+          <p:cNvSpPr>
+            <a:spLocks noGrp="1"/>
+          </p:cNvSpPr>
+          <p:nvPr>
+            <p:ph type="sldNum" sz="quarter" idx="12"/>
+          </p:nvPr>
+        </p:nvSpPr>
+        <p:spPr/>
+        <p:txBody>
+          <a:bodyPr/>
+          <a:lstStyle/>
+          <a:p>
+            <a:fld id="{02A24B53-BD4C-4445-BAE1-C9D880719956}" type="slidenum">
+              <a:rPr lang="ru-RU" sz="3600" smtClean="0"/>
+              <a:t>5</a:t>
+            </a:fld>
+            <a:endParaRPr lang="ru-RU" sz="2800" dirty="0"/>
+          </a:p>
+        </p:txBody>
+      </p:sp>
+      <p:pic>
+        <p:nvPicPr>
+          <p:cNvPr id="9" name="Объект 8">
+            <a:extLst>
+              <a:ext uri="{FF2B5EF4-FFF2-40B4-BE49-F238E27FC236}">
+                <a16:creationId xmlns:a16="http://schemas.microsoft.com/office/drawing/2014/main" id="{E6ACDFDC-60AB-474C-8956-E9A242BC9BE2}"/>
+              </a:ext>
+            </a:extLst>
+          </p:cNvPr>
+          <p:cNvPicPr>
+            <a:picLocks noGrp="1" noChangeAspect="1"/>
+          </p:cNvPicPr>
+          <p:nvPr>
+            <p:ph idx="1"/>
+          </p:nvPr>
+        </p:nvPicPr>
+        <p:blipFill>
+          <a:blip r:embed="rId2">
+            <a:extLst>
+              <a:ext uri="{28A0092B-C50C-407E-A947-70E740481C1C}">
+                <a14:useLocalDpi xmlns:a14="http://schemas.microsoft.com/office/drawing/2010/main" val="0"/>
+              </a:ext>
+            </a:extLst>
+          </a:blip>
+          <a:stretch>
+            <a:fillRect/>
+          </a:stretch>
+        </p:blipFill>
+        <p:spPr>
+          <a:xfrm>
+            <a:off x="354228" y="-12791"/>
+            <a:ext cx="10536555" cy="6261191"/>
+          </a:xfrm>
+        </p:spPr>
+      </p:pic>
+    </p:spTree>
+    <p:extLst>
+      <p:ext uri="{BB962C8B-B14F-4D97-AF65-F5344CB8AC3E}">
+        <p14:creationId xmlns:p14="http://schemas.microsoft.com/office/powerpoint/2010/main" val="4258705114"/>
+      </p:ext>
+    </p:extLst>
+  </p:cSld>
+  <p:clrMapOvr>
+    <a:masterClrMapping/>
+  </p:clrMapOvr>
+</p:sld>
+</file>
+
+<file path=ppt/slides/slide6.xml><?xml version="1.0" encoding="utf-8"?>
+<p:sld xmlns:a="http://schemas.openxmlformats.org/drawingml/2006/main" xmlns:r="http://schemas.openxmlformats.org/officeDocument/2006/relationships" xmlns:p="http://schemas.openxmlformats.org/presentationml/2006/main">
+  <p:cSld>
+    <p:spTree>
+      <p:nvGrpSpPr>
+        <p:cNvPr id="1" name=""/>
+        <p:cNvGrpSpPr/>
+        <p:nvPr/>
+      </p:nvGrpSpPr>
+      <p:grpSpPr>
+        <a:xfrm>
+          <a:off x="0" y="0"/>
+          <a:ext cx="0" cy="0"/>
+          <a:chOff x="0" y="0"/>
+          <a:chExt cx="0" cy="0"/>
+        </a:xfrm>
+      </p:grpSpPr>
+      <p:sp>
+        <p:nvSpPr>
+          <p:cNvPr id="2" name="Заголовок 1">
+            <a:extLst>
+              <a:ext uri="{FF2B5EF4-FFF2-40B4-BE49-F238E27FC236}">
+                <a16:creationId xmlns:a16="http://schemas.microsoft.com/office/drawing/2014/main" id="{8D736E3D-C51E-4BE1-B282-2228D4D750BD}"/>
+              </a:ext>
+            </a:extLst>
+          </p:cNvPr>
+          <p:cNvSpPr>
+            <a:spLocks noGrp="1"/>
+          </p:cNvSpPr>
+          <p:nvPr>
+            <p:ph type="title"/>
+          </p:nvPr>
+        </p:nvSpPr>
+        <p:spPr>
+          <a:xfrm>
+            <a:off x="913795" y="0"/>
+            <a:ext cx="10353762" cy="572907"/>
+          </a:xfrm>
+        </p:spPr>
+        <p:txBody>
+          <a:bodyPr>
+            <a:noAutofit/>
+          </a:bodyPr>
+          <a:lstStyle/>
+          <a:p>
+            <a:r>
+              <a:rPr lang="ru-RU" sz="6000" dirty="0"/>
+              <a:t>Стек технологий</a:t>
+            </a:r>
+          </a:p>
+        </p:txBody>
+      </p:sp>
+      <p:pic>
+        <p:nvPicPr>
+          <p:cNvPr id="9" name="Объект 8">
+            <a:extLst>
+              <a:ext uri="{FF2B5EF4-FFF2-40B4-BE49-F238E27FC236}">
+                <a16:creationId xmlns:a16="http://schemas.microsoft.com/office/drawing/2014/main" id="{436CEDB7-C409-4ADE-8FC7-1CBEED9FD645}"/>
+              </a:ext>
+            </a:extLst>
+          </p:cNvPr>
+          <p:cNvPicPr>
+            <a:picLocks noGrp="1" noChangeAspect="1"/>
+          </p:cNvPicPr>
+          <p:nvPr>
+            <p:ph idx="1"/>
+          </p:nvPr>
+        </p:nvPicPr>
+        <p:blipFill>
+          <a:blip r:embed="rId2">
+            <a:extLst>
+              <a:ext uri="{28A0092B-C50C-407E-A947-70E740481C1C}">
+                <a14:useLocalDpi xmlns:a14="http://schemas.microsoft.com/office/drawing/2010/main" val="0"/>
+              </a:ext>
+            </a:extLst>
+          </a:blip>
+          <a:stretch>
+            <a:fillRect/>
+          </a:stretch>
+        </p:blipFill>
+        <p:spPr>
+          <a:xfrm>
+            <a:off x="1360357" y="3908200"/>
+            <a:ext cx="1091194" cy="1091194"/>
+          </a:xfrm>
+        </p:spPr>
+      </p:pic>
+      <p:sp>
+        <p:nvSpPr>
+          <p:cNvPr id="4" name="Номер слайда 3">
+            <a:extLst>
+              <a:ext uri="{FF2B5EF4-FFF2-40B4-BE49-F238E27FC236}">
+                <a16:creationId xmlns:a16="http://schemas.microsoft.com/office/drawing/2014/main" id="{BB31AA11-5AC3-4E95-B18F-AE5DE54A8314}"/>
+              </a:ext>
+            </a:extLst>
+          </p:cNvPr>
+          <p:cNvSpPr>
+            <a:spLocks noGrp="1"/>
+          </p:cNvSpPr>
+          <p:nvPr>
+            <p:ph type="sldNum" sz="quarter" idx="12"/>
+          </p:nvPr>
+        </p:nvSpPr>
+        <p:spPr/>
+        <p:txBody>
+          <a:bodyPr/>
+          <a:lstStyle/>
+          <a:p>
+            <a:fld id="{02A24B53-BD4C-4445-BAE1-C9D880719956}" type="slidenum">
+              <a:rPr lang="ru-RU" sz="3600" smtClean="0"/>
+              <a:t>6</a:t>
+            </a:fld>
+            <a:endParaRPr lang="ru-RU" sz="3600" dirty="0"/>
+          </a:p>
+        </p:txBody>
+      </p:sp>
+      <p:sp>
+        <p:nvSpPr>
+          <p:cNvPr id="5" name="TextBox 4">
+            <a:extLst>
+              <a:ext uri="{FF2B5EF4-FFF2-40B4-BE49-F238E27FC236}">
+                <a16:creationId xmlns:a16="http://schemas.microsoft.com/office/drawing/2014/main" id="{0B73B463-E23E-4861-ACA8-0C283CAB1184}"/>
+              </a:ext>
+            </a:extLst>
+          </p:cNvPr>
+          <p:cNvSpPr txBox="1"/>
+          <p:nvPr/>
+        </p:nvSpPr>
+        <p:spPr>
+          <a:xfrm>
+            <a:off x="924443" y="1066800"/>
+            <a:ext cx="1963024" cy="707886"/>
+          </a:xfrm>
+          <a:prstGeom prst="rect">
+            <a:avLst/>
+          </a:prstGeom>
+          <a:noFill/>
+        </p:spPr>
+        <p:txBody>
+          <a:bodyPr wrap="square" rtlCol="0">
+            <a:spAutoFit/>
+          </a:bodyPr>
+          <a:lstStyle/>
+          <a:p>
+            <a:r>
+              <a:rPr lang="ru-RU" sz="4000" dirty="0"/>
+              <a:t>Клиент</a:t>
+            </a:r>
+          </a:p>
+        </p:txBody>
+      </p:sp>
+      <p:sp>
+        <p:nvSpPr>
+          <p:cNvPr id="6" name="TextBox 5">
+            <a:extLst>
+              <a:ext uri="{FF2B5EF4-FFF2-40B4-BE49-F238E27FC236}">
+                <a16:creationId xmlns:a16="http://schemas.microsoft.com/office/drawing/2014/main" id="{820624FC-AF20-4341-BB21-721834819A5F}"/>
+              </a:ext>
+            </a:extLst>
+          </p:cNvPr>
+          <p:cNvSpPr txBox="1"/>
+          <p:nvPr/>
+        </p:nvSpPr>
+        <p:spPr>
+          <a:xfrm>
+            <a:off x="5184819" y="1045682"/>
+            <a:ext cx="1811714" cy="707886"/>
+          </a:xfrm>
+          <a:prstGeom prst="rect">
+            <a:avLst/>
+          </a:prstGeom>
+          <a:noFill/>
+        </p:spPr>
+        <p:txBody>
+          <a:bodyPr wrap="none" rtlCol="0">
+            <a:spAutoFit/>
+          </a:bodyPr>
+          <a:lstStyle/>
+          <a:p>
+            <a:r>
+              <a:rPr lang="ru-RU" sz="4000" dirty="0"/>
+              <a:t>Сервер</a:t>
+            </a:r>
+          </a:p>
+        </p:txBody>
+      </p:sp>
+      <p:sp>
+        <p:nvSpPr>
+          <p:cNvPr id="7" name="TextBox 6">
+            <a:extLst>
+              <a:ext uri="{FF2B5EF4-FFF2-40B4-BE49-F238E27FC236}">
+                <a16:creationId xmlns:a16="http://schemas.microsoft.com/office/drawing/2014/main" id="{C1CC1FED-CD51-4C32-9F90-5A043E16CB80}"/>
+              </a:ext>
+            </a:extLst>
+          </p:cNvPr>
+          <p:cNvSpPr txBox="1"/>
+          <p:nvPr/>
+        </p:nvSpPr>
+        <p:spPr>
+          <a:xfrm>
+            <a:off x="8309695" y="1066800"/>
+            <a:ext cx="2957861" cy="646331"/>
+          </a:xfrm>
+          <a:prstGeom prst="rect">
+            <a:avLst/>
+          </a:prstGeom>
+          <a:noFill/>
+        </p:spPr>
+        <p:txBody>
+          <a:bodyPr wrap="none" rtlCol="0">
+            <a:spAutoFit/>
+          </a:bodyPr>
+          <a:lstStyle/>
+          <a:p>
+            <a:r>
+              <a:rPr lang="ru-RU" sz="3600" dirty="0"/>
+              <a:t>Базы данных</a:t>
+            </a:r>
+          </a:p>
+        </p:txBody>
+      </p:sp>
+      <p:pic>
+        <p:nvPicPr>
+          <p:cNvPr id="11" name="Рисунок 10">
+            <a:extLst>
+              <a:ext uri="{FF2B5EF4-FFF2-40B4-BE49-F238E27FC236}">
+                <a16:creationId xmlns:a16="http://schemas.microsoft.com/office/drawing/2014/main" id="{224A6571-A4FC-4B81-B5DA-793989517E62}"/>
+              </a:ext>
+            </a:extLst>
+          </p:cNvPr>
+          <p:cNvPicPr>
+            <a:picLocks noChangeAspect="1"/>
+          </p:cNvPicPr>
+          <p:nvPr/>
+        </p:nvPicPr>
+        <p:blipFill>
+          <a:blip r:embed="rId3">
+            <a:extLst>
+              <a:ext uri="{28A0092B-C50C-407E-A947-70E740481C1C}">
+                <a14:useLocalDpi xmlns:a14="http://schemas.microsoft.com/office/drawing/2010/main" val="0"/>
+              </a:ext>
+            </a:extLst>
+          </a:blip>
+          <a:stretch>
+            <a:fillRect/>
+          </a:stretch>
+        </p:blipFill>
+        <p:spPr>
+          <a:xfrm>
+            <a:off x="1429442" y="5317213"/>
+            <a:ext cx="953024" cy="848787"/>
+          </a:xfrm>
+          <a:prstGeom prst="rect">
+            <a:avLst/>
+          </a:prstGeom>
+        </p:spPr>
+      </p:pic>
+      <p:pic>
+        <p:nvPicPr>
+          <p:cNvPr id="13" name="Рисунок 12">
+            <a:extLst>
+              <a:ext uri="{FF2B5EF4-FFF2-40B4-BE49-F238E27FC236}">
+                <a16:creationId xmlns:a16="http://schemas.microsoft.com/office/drawing/2014/main" id="{02F925EB-9EF1-468E-93BE-3AD2C774A80A}"/>
+              </a:ext>
+            </a:extLst>
+          </p:cNvPr>
+          <p:cNvPicPr>
+            <a:picLocks noChangeAspect="1"/>
+          </p:cNvPicPr>
+          <p:nvPr/>
+        </p:nvPicPr>
+        <p:blipFill>
+          <a:blip r:embed="rId4">
+            <a:extLst>
+              <a:ext uri="{28A0092B-C50C-407E-A947-70E740481C1C}">
+                <a14:useLocalDpi xmlns:a14="http://schemas.microsoft.com/office/drawing/2010/main" val="0"/>
+              </a:ext>
+            </a:extLst>
+          </a:blip>
+          <a:stretch>
+            <a:fillRect/>
+          </a:stretch>
+        </p:blipFill>
+        <p:spPr>
+          <a:xfrm>
+            <a:off x="5790731" y="5867961"/>
+            <a:ext cx="490231" cy="990039"/>
+          </a:xfrm>
+          <a:prstGeom prst="rect">
+            <a:avLst/>
+          </a:prstGeom>
+        </p:spPr>
+      </p:pic>
+      <p:pic>
+        <p:nvPicPr>
+          <p:cNvPr id="15" name="Рисунок 14">
+            <a:extLst>
+              <a:ext uri="{FF2B5EF4-FFF2-40B4-BE49-F238E27FC236}">
+                <a16:creationId xmlns:a16="http://schemas.microsoft.com/office/drawing/2014/main" id="{0220A109-BEB1-4E86-B382-30631A2DDEF8}"/>
+              </a:ext>
+            </a:extLst>
+          </p:cNvPr>
+          <p:cNvPicPr>
+            <a:picLocks noChangeAspect="1"/>
+          </p:cNvPicPr>
+          <p:nvPr/>
+        </p:nvPicPr>
+        <p:blipFill>
+          <a:blip r:embed="rId5">
+            <a:extLst>
+              <a:ext uri="{28A0092B-C50C-407E-A947-70E740481C1C}">
+                <a14:useLocalDpi xmlns:a14="http://schemas.microsoft.com/office/drawing/2010/main" val="0"/>
+              </a:ext>
+            </a:extLst>
+          </a:blip>
+          <a:stretch>
+            <a:fillRect/>
+          </a:stretch>
+        </p:blipFill>
+        <p:spPr>
+          <a:xfrm>
+            <a:off x="5684299" y="3814423"/>
+            <a:ext cx="812753" cy="891897"/>
+          </a:xfrm>
+          <a:prstGeom prst="rect">
+            <a:avLst/>
+          </a:prstGeom>
+        </p:spPr>
+      </p:pic>
+      <p:pic>
+        <p:nvPicPr>
+          <p:cNvPr id="17" name="Рисунок 16">
+            <a:extLst>
+              <a:ext uri="{FF2B5EF4-FFF2-40B4-BE49-F238E27FC236}">
+                <a16:creationId xmlns:a16="http://schemas.microsoft.com/office/drawing/2014/main" id="{4F077DBC-F228-47CD-8027-28F5391EFBA1}"/>
+              </a:ext>
+            </a:extLst>
+          </p:cNvPr>
+          <p:cNvPicPr>
+            <a:picLocks noChangeAspect="1"/>
+          </p:cNvPicPr>
+          <p:nvPr/>
+        </p:nvPicPr>
+        <p:blipFill>
+          <a:blip r:embed="rId6">
+            <a:extLst>
+              <a:ext uri="{28A0092B-C50C-407E-A947-70E740481C1C}">
+                <a14:useLocalDpi xmlns:a14="http://schemas.microsoft.com/office/drawing/2010/main" val="0"/>
+              </a:ext>
+              <a:ext uri="{96DAC541-7B7A-43D3-8B79-37D633B846F1}">
+                <asvg:svgBlip xmlns:asvg="http://schemas.microsoft.com/office/drawing/2016/SVG/main" r:embed="rId7"/>
+              </a:ext>
+            </a:extLst>
+          </a:blip>
+          <a:stretch>
+            <a:fillRect/>
+          </a:stretch>
+        </p:blipFill>
+        <p:spPr>
+          <a:xfrm>
+            <a:off x="5790731" y="4956051"/>
+            <a:ext cx="517790" cy="659437"/>
+          </a:xfrm>
+          <a:prstGeom prst="rect">
+            <a:avLst/>
+          </a:prstGeom>
+        </p:spPr>
+      </p:pic>
+      <p:pic>
+        <p:nvPicPr>
+          <p:cNvPr id="19" name="Рисунок 18">
+            <a:extLst>
+              <a:ext uri="{FF2B5EF4-FFF2-40B4-BE49-F238E27FC236}">
+                <a16:creationId xmlns:a16="http://schemas.microsoft.com/office/drawing/2014/main" id="{6749594A-FFE2-41AC-BF57-F94E8686F7B6}"/>
+              </a:ext>
+            </a:extLst>
+          </p:cNvPr>
+          <p:cNvPicPr>
+            <a:picLocks noChangeAspect="1"/>
+          </p:cNvPicPr>
+          <p:nvPr/>
+        </p:nvPicPr>
+        <p:blipFill>
+          <a:blip r:embed="rId8">
+            <a:extLst>
+              <a:ext uri="{28A0092B-C50C-407E-A947-70E740481C1C}">
+                <a14:useLocalDpi xmlns:a14="http://schemas.microsoft.com/office/drawing/2010/main" val="0"/>
+              </a:ext>
+            </a:extLst>
+          </a:blip>
+          <a:stretch>
+            <a:fillRect/>
+          </a:stretch>
+        </p:blipFill>
+        <p:spPr>
+          <a:xfrm>
+            <a:off x="9222884" y="3758947"/>
+            <a:ext cx="972472" cy="1002847"/>
+          </a:xfrm>
+          <a:prstGeom prst="rect">
+            <a:avLst/>
+          </a:prstGeom>
+        </p:spPr>
+      </p:pic>
+      <p:pic>
+        <p:nvPicPr>
+          <p:cNvPr id="21" name="Рисунок 20">
+            <a:extLst>
+              <a:ext uri="{FF2B5EF4-FFF2-40B4-BE49-F238E27FC236}">
+                <a16:creationId xmlns:a16="http://schemas.microsoft.com/office/drawing/2014/main" id="{ED08639C-03A8-43C9-B86C-C31ABB04DB01}"/>
+              </a:ext>
+            </a:extLst>
+          </p:cNvPr>
+          <p:cNvPicPr>
+            <a:picLocks noChangeAspect="1"/>
+          </p:cNvPicPr>
+          <p:nvPr/>
+        </p:nvPicPr>
+        <p:blipFill>
+          <a:blip r:embed="rId9">
+            <a:extLst>
+              <a:ext uri="{28A0092B-C50C-407E-A947-70E740481C1C}">
+                <a14:useLocalDpi xmlns:a14="http://schemas.microsoft.com/office/drawing/2010/main" val="0"/>
+              </a:ext>
+            </a:extLst>
+          </a:blip>
+          <a:stretch>
+            <a:fillRect/>
+          </a:stretch>
+        </p:blipFill>
+        <p:spPr>
+          <a:xfrm>
+            <a:off x="8882767" y="1707104"/>
+            <a:ext cx="1632077" cy="1632077"/>
+          </a:xfrm>
+          <a:prstGeom prst="rect">
+            <a:avLst/>
+          </a:prstGeom>
+        </p:spPr>
+      </p:pic>
+      <p:pic>
+        <p:nvPicPr>
+          <p:cNvPr id="23" name="Рисунок 22">
+            <a:extLst>
+              <a:ext uri="{FF2B5EF4-FFF2-40B4-BE49-F238E27FC236}">
+                <a16:creationId xmlns:a16="http://schemas.microsoft.com/office/drawing/2014/main" id="{A9A08DAB-B6D2-4E80-A9F8-CFF26FD137C8}"/>
+              </a:ext>
+            </a:extLst>
+          </p:cNvPr>
+          <p:cNvPicPr>
+            <a:picLocks noChangeAspect="1"/>
+          </p:cNvPicPr>
+          <p:nvPr/>
+        </p:nvPicPr>
+        <p:blipFill>
+          <a:blip r:embed="rId10">
+            <a:extLst>
+              <a:ext uri="{28A0092B-C50C-407E-A947-70E740481C1C}">
+                <a14:useLocalDpi xmlns:a14="http://schemas.microsoft.com/office/drawing/2010/main" val="0"/>
+              </a:ext>
+            </a:extLst>
+          </a:blip>
+          <a:stretch>
+            <a:fillRect/>
+          </a:stretch>
+        </p:blipFill>
+        <p:spPr>
+          <a:xfrm>
+            <a:off x="844787" y="1632793"/>
+            <a:ext cx="2202783" cy="2202783"/>
+          </a:xfrm>
+          <a:prstGeom prst="rect">
+            <a:avLst/>
+          </a:prstGeom>
+        </p:spPr>
+      </p:pic>
+      <p:pic>
+        <p:nvPicPr>
+          <p:cNvPr id="25" name="Рисунок 24">
+            <a:extLst>
+              <a:ext uri="{FF2B5EF4-FFF2-40B4-BE49-F238E27FC236}">
+                <a16:creationId xmlns:a16="http://schemas.microsoft.com/office/drawing/2014/main" id="{8B98D0C1-F642-483F-96CD-BC989CD07E0E}"/>
+              </a:ext>
+            </a:extLst>
+          </p:cNvPr>
+          <p:cNvPicPr>
+            <a:picLocks noChangeAspect="1"/>
+          </p:cNvPicPr>
+          <p:nvPr/>
+        </p:nvPicPr>
+        <p:blipFill>
+          <a:blip r:embed="rId11">
+            <a:extLst>
+              <a:ext uri="{28A0092B-C50C-407E-A947-70E740481C1C}">
+                <a14:useLocalDpi xmlns:a14="http://schemas.microsoft.com/office/drawing/2010/main" val="0"/>
+              </a:ext>
+            </a:extLst>
+          </a:blip>
+          <a:stretch>
+            <a:fillRect/>
+          </a:stretch>
+        </p:blipFill>
+        <p:spPr>
+          <a:xfrm>
+            <a:off x="5205173" y="1714612"/>
+            <a:ext cx="1698297" cy="1698297"/>
+          </a:xfrm>
+          <a:prstGeom prst="rect">
+            <a:avLst/>
+          </a:prstGeom>
+        </p:spPr>
+      </p:pic>
+      <p:sp>
+        <p:nvSpPr>
+          <p:cNvPr id="26" name="TextBox 25">
+            <a:extLst>
+              <a:ext uri="{FF2B5EF4-FFF2-40B4-BE49-F238E27FC236}">
+                <a16:creationId xmlns:a16="http://schemas.microsoft.com/office/drawing/2014/main" id="{B1252A55-3538-4C34-BDFE-B16300BFD3FB}"/>
+              </a:ext>
+            </a:extLst>
+          </p:cNvPr>
+          <p:cNvSpPr txBox="1"/>
+          <p:nvPr/>
+        </p:nvSpPr>
+        <p:spPr>
+          <a:xfrm>
+            <a:off x="1339677" y="3650910"/>
+            <a:ext cx="1132554" cy="369332"/>
+          </a:xfrm>
+          <a:prstGeom prst="rect">
+            <a:avLst/>
+          </a:prstGeom>
+          <a:noFill/>
+        </p:spPr>
+        <p:txBody>
+          <a:bodyPr wrap="none" rtlCol="0">
+            <a:spAutoFit/>
+          </a:bodyPr>
+          <a:lstStyle/>
+          <a:p>
+            <a:r>
+              <a:rPr lang="en-US" dirty="0" err="1"/>
+              <a:t>Javascript</a:t>
+            </a:r>
+            <a:endParaRPr lang="ru-RU" dirty="0"/>
+          </a:p>
+        </p:txBody>
+      </p:sp>
+      <p:sp>
+        <p:nvSpPr>
+          <p:cNvPr id="27" name="TextBox 26">
+            <a:extLst>
+              <a:ext uri="{FF2B5EF4-FFF2-40B4-BE49-F238E27FC236}">
+                <a16:creationId xmlns:a16="http://schemas.microsoft.com/office/drawing/2014/main" id="{AE4B3C43-25D2-4C49-B23E-585CAE824042}"/>
+              </a:ext>
+            </a:extLst>
+          </p:cNvPr>
+          <p:cNvSpPr txBox="1"/>
+          <p:nvPr/>
+        </p:nvSpPr>
+        <p:spPr>
+          <a:xfrm>
+            <a:off x="1537231" y="4916438"/>
+            <a:ext cx="737446" cy="369332"/>
+          </a:xfrm>
+          <a:prstGeom prst="rect">
+            <a:avLst/>
+          </a:prstGeom>
+          <a:noFill/>
+        </p:spPr>
+        <p:txBody>
+          <a:bodyPr wrap="none" rtlCol="0">
+            <a:spAutoFit/>
+          </a:bodyPr>
+          <a:lstStyle/>
+          <a:p>
+            <a:r>
+              <a:rPr lang="en-US" dirty="0"/>
+              <a:t>React</a:t>
+            </a:r>
+            <a:endParaRPr lang="ru-RU" dirty="0"/>
+          </a:p>
+        </p:txBody>
+      </p:sp>
+      <p:sp>
+        <p:nvSpPr>
+          <p:cNvPr id="28" name="TextBox 27">
+            <a:extLst>
+              <a:ext uri="{FF2B5EF4-FFF2-40B4-BE49-F238E27FC236}">
+                <a16:creationId xmlns:a16="http://schemas.microsoft.com/office/drawing/2014/main" id="{405B6BBF-BDD9-4363-B8C6-9E13B7FADF81}"/>
+              </a:ext>
+            </a:extLst>
+          </p:cNvPr>
+          <p:cNvSpPr txBox="1"/>
+          <p:nvPr/>
+        </p:nvSpPr>
+        <p:spPr>
+          <a:xfrm>
+            <a:off x="5617823" y="3429000"/>
+            <a:ext cx="891591" cy="369332"/>
+          </a:xfrm>
+          <a:prstGeom prst="rect">
+            <a:avLst/>
+          </a:prstGeom>
+          <a:noFill/>
+        </p:spPr>
+        <p:txBody>
+          <a:bodyPr wrap="none" rtlCol="0">
+            <a:spAutoFit/>
+          </a:bodyPr>
+          <a:lstStyle/>
+          <a:p>
+            <a:r>
+              <a:rPr lang="en-US" dirty="0"/>
+              <a:t>Python</a:t>
+            </a:r>
+            <a:endParaRPr lang="ru-RU" dirty="0"/>
+          </a:p>
+        </p:txBody>
+      </p:sp>
+      <p:sp>
+        <p:nvSpPr>
+          <p:cNvPr id="29" name="TextBox 28">
+            <a:extLst>
+              <a:ext uri="{FF2B5EF4-FFF2-40B4-BE49-F238E27FC236}">
+                <a16:creationId xmlns:a16="http://schemas.microsoft.com/office/drawing/2014/main" id="{123788B2-11D2-46C1-8388-FFB26E792CBA}"/>
+              </a:ext>
+            </a:extLst>
+          </p:cNvPr>
+          <p:cNvSpPr txBox="1"/>
+          <p:nvPr/>
+        </p:nvSpPr>
+        <p:spPr>
+          <a:xfrm>
+            <a:off x="5608204" y="4547106"/>
+            <a:ext cx="910827" cy="369332"/>
+          </a:xfrm>
+          <a:prstGeom prst="rect">
+            <a:avLst/>
+          </a:prstGeom>
+          <a:noFill/>
+        </p:spPr>
+        <p:txBody>
+          <a:bodyPr wrap="none" rtlCol="0">
+            <a:spAutoFit/>
+          </a:bodyPr>
+          <a:lstStyle/>
+          <a:p>
+            <a:r>
+              <a:rPr lang="en-US" dirty="0"/>
+              <a:t>Django</a:t>
+            </a:r>
+            <a:endParaRPr lang="ru-RU" dirty="0"/>
+          </a:p>
+        </p:txBody>
+      </p:sp>
+      <p:sp>
+        <p:nvSpPr>
+          <p:cNvPr id="30" name="TextBox 29">
+            <a:extLst>
+              <a:ext uri="{FF2B5EF4-FFF2-40B4-BE49-F238E27FC236}">
+                <a16:creationId xmlns:a16="http://schemas.microsoft.com/office/drawing/2014/main" id="{DE7C54EC-E338-4BE2-8552-72B9E30406DF}"/>
+              </a:ext>
+            </a:extLst>
+          </p:cNvPr>
+          <p:cNvSpPr txBox="1"/>
+          <p:nvPr/>
+        </p:nvSpPr>
+        <p:spPr>
+          <a:xfrm>
+            <a:off x="5617823" y="5531757"/>
+            <a:ext cx="867545" cy="369332"/>
+          </a:xfrm>
+          <a:prstGeom prst="rect">
+            <a:avLst/>
+          </a:prstGeom>
+          <a:noFill/>
+        </p:spPr>
+        <p:txBody>
+          <a:bodyPr wrap="none" rtlCol="0">
+            <a:spAutoFit/>
+          </a:bodyPr>
+          <a:lstStyle/>
+          <a:p>
+            <a:r>
+              <a:rPr lang="en-US" dirty="0" err="1"/>
+              <a:t>MinIO</a:t>
+            </a:r>
+            <a:endParaRPr lang="ru-RU" dirty="0"/>
+          </a:p>
+        </p:txBody>
+      </p:sp>
+      <p:sp>
+        <p:nvSpPr>
+          <p:cNvPr id="31" name="TextBox 30">
+            <a:extLst>
+              <a:ext uri="{FF2B5EF4-FFF2-40B4-BE49-F238E27FC236}">
+                <a16:creationId xmlns:a16="http://schemas.microsoft.com/office/drawing/2014/main" id="{84B11465-1E17-47BD-9776-9482128A92CE}"/>
+              </a:ext>
+            </a:extLst>
+          </p:cNvPr>
+          <p:cNvSpPr txBox="1"/>
+          <p:nvPr/>
+        </p:nvSpPr>
+        <p:spPr>
+          <a:xfrm>
+            <a:off x="9015893" y="3339181"/>
+            <a:ext cx="1365823" cy="369332"/>
+          </a:xfrm>
+          <a:prstGeom prst="rect">
+            <a:avLst/>
+          </a:prstGeom>
+          <a:noFill/>
+        </p:spPr>
+        <p:txBody>
+          <a:bodyPr wrap="none" rtlCol="0">
+            <a:spAutoFit/>
+          </a:bodyPr>
+          <a:lstStyle/>
+          <a:p>
+            <a:r>
+              <a:rPr lang="en-US" dirty="0"/>
+              <a:t>PostgreSQL</a:t>
+            </a:r>
+            <a:endParaRPr lang="ru-RU" dirty="0"/>
+          </a:p>
+        </p:txBody>
+      </p:sp>
+    </p:spTree>
+    <p:extLst>
+      <p:ext uri="{BB962C8B-B14F-4D97-AF65-F5344CB8AC3E}">
+        <p14:creationId xmlns:p14="http://schemas.microsoft.com/office/powerpoint/2010/main" val="474423871"/>
+      </p:ext>
+    </p:extLst>
+  </p:cSld>
+  <p:clrMapOvr>
+    <a:masterClrMapping/>
+  </p:clrMapOvr>
+</p:sld>
+</file>
+
+<file path=ppt/slides/slide7.xml><?xml version="1.0" encoding="utf-8"?>
+<p:sld xmlns:a="http://schemas.openxmlformats.org/drawingml/2006/main" xmlns:r="http://schemas.openxmlformats.org/officeDocument/2006/relationships" xmlns:p="http://schemas.openxmlformats.org/presentationml/2006/main">
+  <p:cSld>
+    <p:spTree>
+      <p:nvGrpSpPr>
+        <p:cNvPr id="1" name=""/>
+        <p:cNvGrpSpPr/>
+        <p:nvPr/>
+      </p:nvGrpSpPr>
+      <p:grpSpPr>
+        <a:xfrm>
+          <a:off x="0" y="0"/>
+          <a:ext cx="0" cy="0"/>
+          <a:chOff x="0" y="0"/>
+          <a:chExt cx="0" cy="0"/>
+        </a:xfrm>
+      </p:grpSpPr>
+      <p:sp>
+        <p:nvSpPr>
+          <p:cNvPr id="2" name="Заголовок 1">
+            <a:extLst>
+              <a:ext uri="{FF2B5EF4-FFF2-40B4-BE49-F238E27FC236}">
+                <a16:creationId xmlns:a16="http://schemas.microsoft.com/office/drawing/2014/main" id="{06E74D8C-D643-4DCE-9C86-E732F6849A55}"/>
+              </a:ext>
+            </a:extLst>
+          </p:cNvPr>
+          <p:cNvSpPr>
+            <a:spLocks noGrp="1"/>
+          </p:cNvSpPr>
+          <p:nvPr>
+            <p:ph type="title"/>
+          </p:nvPr>
+        </p:nvSpPr>
+        <p:spPr>
+          <a:xfrm>
+            <a:off x="1097280" y="0"/>
+            <a:ext cx="10058400" cy="609600"/>
+          </a:xfrm>
+        </p:spPr>
+        <p:txBody>
+          <a:bodyPr>
+            <a:noAutofit/>
+          </a:bodyPr>
+          <a:lstStyle/>
+          <a:p>
+            <a:pPr algn="ctr"/>
+            <a:r>
+              <a:rPr lang="ru-RU" sz="6000" dirty="0"/>
+              <a:t>Главная страница</a:t>
+            </a:r>
+          </a:p>
+        </p:txBody>
+      </p:sp>
+      <p:sp>
+        <p:nvSpPr>
+          <p:cNvPr id="3" name="Объект 2">
+            <a:extLst>
+              <a:ext uri="{FF2B5EF4-FFF2-40B4-BE49-F238E27FC236}">
+                <a16:creationId xmlns:a16="http://schemas.microsoft.com/office/drawing/2014/main" id="{CCA093B3-D07E-4F51-99F6-2E837A19D81E}"/>
+              </a:ext>
+            </a:extLst>
+          </p:cNvPr>
+          <p:cNvSpPr>
+            <a:spLocks noGrp="1"/>
+          </p:cNvSpPr>
+          <p:nvPr>
+            <p:ph idx="1"/>
+          </p:nvPr>
+        </p:nvSpPr>
+        <p:spPr/>
+        <p:txBody>
+          <a:bodyPr/>
+          <a:lstStyle/>
+          <a:p>
+            <a:endParaRPr lang="ru-RU" dirty="0"/>
+          </a:p>
+        </p:txBody>
+      </p:sp>
+      <p:sp>
+        <p:nvSpPr>
+          <p:cNvPr id="8" name="Номер слайда 7">
+            <a:extLst>
+              <a:ext uri="{FF2B5EF4-FFF2-40B4-BE49-F238E27FC236}">
+                <a16:creationId xmlns:a16="http://schemas.microsoft.com/office/drawing/2014/main" id="{25CD8033-14E0-4D84-A3FD-0B5AF77F8F78}"/>
+              </a:ext>
+            </a:extLst>
+          </p:cNvPr>
+          <p:cNvSpPr>
+            <a:spLocks noGrp="1"/>
+          </p:cNvSpPr>
+          <p:nvPr>
+            <p:ph type="sldNum" sz="quarter" idx="12"/>
+          </p:nvPr>
+        </p:nvSpPr>
+        <p:spPr/>
+        <p:txBody>
+          <a:bodyPr/>
+          <a:lstStyle/>
+          <a:p>
+            <a:fld id="{02A24B53-BD4C-4445-BAE1-C9D880719956}" type="slidenum">
+              <a:rPr lang="ru-RU" sz="3600" smtClean="0"/>
+              <a:t>7</a:t>
+            </a:fld>
+            <a:endParaRPr lang="ru-RU" sz="2800" dirty="0"/>
+          </a:p>
+        </p:txBody>
+      </p:sp>
+      <p:pic>
+        <p:nvPicPr>
+          <p:cNvPr id="5" name="Рисунок 4">
+            <a:extLst>
+              <a:ext uri="{FF2B5EF4-FFF2-40B4-BE49-F238E27FC236}">
+                <a16:creationId xmlns:a16="http://schemas.microsoft.com/office/drawing/2014/main" id="{1789FCBC-CF65-4436-8663-C79906320256}"/>
+              </a:ext>
+            </a:extLst>
+          </p:cNvPr>
+          <p:cNvPicPr>
+            <a:picLocks noChangeAspect="1"/>
+          </p:cNvPicPr>
+          <p:nvPr/>
+        </p:nvPicPr>
+        <p:blipFill>
+          <a:blip r:embed="rId2"/>
+          <a:stretch>
+            <a:fillRect/>
+          </a:stretch>
+        </p:blipFill>
+        <p:spPr>
+          <a:xfrm>
+            <a:off x="164961" y="838200"/>
+            <a:ext cx="10501450" cy="5181600"/>
+          </a:xfrm>
+          <a:prstGeom prst="rect">
+            <a:avLst/>
+          </a:prstGeom>
+        </p:spPr>
+      </p:pic>
+    </p:spTree>
+    <p:extLst>
+      <p:ext uri="{BB962C8B-B14F-4D97-AF65-F5344CB8AC3E}">
+        <p14:creationId xmlns:p14="http://schemas.microsoft.com/office/powerpoint/2010/main" val="2719750808"/>
+      </p:ext>
+    </p:extLst>
+  </p:cSld>
+  <p:clrMapOvr>
+    <a:masterClrMapping/>
+  </p:clrMapOvr>
+</p:sld>
+</file>
+
+<file path=ppt/slides/slide8.xml><?xml version="1.0" encoding="utf-8"?>
+<p:sld xmlns:a="http://schemas.openxmlformats.org/drawingml/2006/main" xmlns:r="http://schemas.openxmlformats.org/officeDocument/2006/relationships" xmlns:p="http://schemas.openxmlformats.org/presentationml/2006/main">
+  <p:cSld>
+    <p:spTree>
+      <p:nvGrpSpPr>
+        <p:cNvPr id="1" name=""/>
+        <p:cNvGrpSpPr/>
+        <p:nvPr/>
+      </p:nvGrpSpPr>
+      <p:grpSpPr>
+        <a:xfrm>
+          <a:off x="0" y="0"/>
+          <a:ext cx="0" cy="0"/>
+          <a:chOff x="0" y="0"/>
+          <a:chExt cx="0" cy="0"/>
+        </a:xfrm>
+      </p:grpSpPr>
+      <p:sp>
+        <p:nvSpPr>
+          <p:cNvPr id="2" name="Заголовок 1">
+            <a:extLst>
+              <a:ext uri="{FF2B5EF4-FFF2-40B4-BE49-F238E27FC236}">
+                <a16:creationId xmlns:a16="http://schemas.microsoft.com/office/drawing/2014/main" id="{35B9E733-3843-4491-AFD3-BB9BFE05DA7A}"/>
+              </a:ext>
+            </a:extLst>
+          </p:cNvPr>
+          <p:cNvSpPr>
+            <a:spLocks noGrp="1"/>
+          </p:cNvSpPr>
+          <p:nvPr>
+            <p:ph type="title"/>
+          </p:nvPr>
+        </p:nvSpPr>
+        <p:spPr>
+          <a:xfrm>
+            <a:off x="1097280" y="1"/>
+            <a:ext cx="10058400" cy="609599"/>
+          </a:xfrm>
+        </p:spPr>
+        <p:txBody>
+          <a:bodyPr>
+            <a:noAutofit/>
+          </a:bodyPr>
+          <a:lstStyle/>
+          <a:p>
+            <a:pPr algn="ctr"/>
+            <a:r>
+              <a:rPr lang="ru-RU" sz="6000" dirty="0"/>
+              <a:t>Создание объявлений</a:t>
+            </a:r>
+          </a:p>
+        </p:txBody>
+      </p:sp>
+      <p:sp>
+        <p:nvSpPr>
+          <p:cNvPr id="5" name="Номер слайда 4">
+            <a:extLst>
+              <a:ext uri="{FF2B5EF4-FFF2-40B4-BE49-F238E27FC236}">
+                <a16:creationId xmlns:a16="http://schemas.microsoft.com/office/drawing/2014/main" id="{97F60CE1-AD1A-4674-8682-B99E749022C4}"/>
+              </a:ext>
+            </a:extLst>
+          </p:cNvPr>
+          <p:cNvSpPr>
+            <a:spLocks noGrp="1"/>
+          </p:cNvSpPr>
+          <p:nvPr>
+            <p:ph type="sldNum" sz="quarter" idx="12"/>
+          </p:nvPr>
+        </p:nvSpPr>
+        <p:spPr/>
+        <p:txBody>
+          <a:bodyPr/>
+          <a:lstStyle/>
+          <a:p>
+            <a:fld id="{02A24B53-BD4C-4445-BAE1-C9D880719956}" type="slidenum">
+              <a:rPr lang="ru-RU" sz="3600" smtClean="0"/>
+              <a:t>8</a:t>
+            </a:fld>
+            <a:endParaRPr lang="ru-RU" sz="2800" dirty="0"/>
+          </a:p>
+        </p:txBody>
+      </p:sp>
+      <p:sp>
+        <p:nvSpPr>
+          <p:cNvPr id="6" name="Объект 5">
+            <a:extLst>
+              <a:ext uri="{FF2B5EF4-FFF2-40B4-BE49-F238E27FC236}">
+                <a16:creationId xmlns:a16="http://schemas.microsoft.com/office/drawing/2014/main" id="{A052186F-FFAB-4209-BED5-D15640E9373D}"/>
+              </a:ext>
+            </a:extLst>
+          </p:cNvPr>
+          <p:cNvSpPr>
+            <a:spLocks noGrp="1"/>
+          </p:cNvSpPr>
+          <p:nvPr>
+            <p:ph idx="1"/>
+          </p:nvPr>
+        </p:nvSpPr>
+        <p:spPr/>
+        <p:txBody>
+          <a:bodyPr/>
+          <a:lstStyle/>
+          <a:p>
+            <a:endParaRPr lang="ru-RU"/>
+          </a:p>
+        </p:txBody>
+      </p:sp>
+      <p:pic>
+        <p:nvPicPr>
+          <p:cNvPr id="10" name="Рисунок 9">
+            <a:extLst>
+              <a:ext uri="{FF2B5EF4-FFF2-40B4-BE49-F238E27FC236}">
+                <a16:creationId xmlns:a16="http://schemas.microsoft.com/office/drawing/2014/main" id="{33740913-4193-4271-94F1-88C396F427D5}"/>
+              </a:ext>
+            </a:extLst>
+          </p:cNvPr>
+          <p:cNvPicPr>
+            <a:picLocks noChangeAspect="1"/>
+          </p:cNvPicPr>
+          <p:nvPr/>
+        </p:nvPicPr>
+        <p:blipFill>
+          <a:blip r:embed="rId2"/>
+          <a:stretch>
+            <a:fillRect/>
+          </a:stretch>
+        </p:blipFill>
+        <p:spPr>
+          <a:xfrm>
+            <a:off x="387427" y="1262043"/>
+            <a:ext cx="11133453" cy="4333913"/>
+          </a:xfrm>
+          <a:prstGeom prst="rect">
+            <a:avLst/>
+          </a:prstGeom>
+        </p:spPr>
+      </p:pic>
+    </p:spTree>
+    <p:extLst>
+      <p:ext uri="{BB962C8B-B14F-4D97-AF65-F5344CB8AC3E}">
+        <p14:creationId xmlns:p14="http://schemas.microsoft.com/office/powerpoint/2010/main" val="2039018359"/>
+      </p:ext>
+    </p:extLst>
+  </p:cSld>
+  <p:clrMapOvr>
+    <a:masterClrMapping/>
+  </p:clrMapOvr>
+</p:sld>
+</file>
+
 <file path=ppt/slides/slide9.xml><?xml version="1.0" encoding="utf-8"?>
 <p:sld xmlns:a="http://schemas.openxmlformats.org/drawingml/2006/main" xmlns:r="http://schemas.openxmlformats.org/officeDocument/2006/relationships" xmlns:p="http://schemas.openxmlformats.org/presentationml/2006/main">
   <p:cSld>
@@ -7823,7 +8774,7 @@
           <p:cNvPr id="2" name="Заголовок 1">
             <a:extLst>
               <a:ext uri="{FF2B5EF4-FFF2-40B4-BE49-F238E27FC236}">
-                <a16:creationId xmlns:a16="http://schemas.microsoft.com/office/drawing/2014/main" id="{AE909BBB-6F23-4909-B443-320B9F877695}"/>
+                <a16:creationId xmlns:a16="http://schemas.microsoft.com/office/drawing/2014/main" id="{DD84749D-DC7E-4B14-889C-E317C48C52B3}"/>
               </a:ext>
             </a:extLst>
           </p:cNvPr>
@@ -7836,30 +8787,29 @@
         </p:nvSpPr>
         <p:spPr>
           <a:xfrm>
-            <a:off x="1097280" y="286604"/>
-            <a:ext cx="10058400" cy="988524"/>
+            <a:off x="913795" y="0"/>
+            <a:ext cx="10353762" cy="609600"/>
           </a:xfrm>
         </p:spPr>
         <p:txBody>
           <a:bodyPr>
-            <a:normAutofit/>
+            <a:noAutofit/>
           </a:bodyPr>
           <a:lstStyle/>
           <a:p>
-            <a:pPr algn="ctr"/>
-            <a:r>
-              <a:rPr lang="ru-RU" sz="5400" dirty="0"/>
-              <a:t>Планы на будущее</a:t>
-            </a:r>
-          </a:p>
-        </p:txBody>
-      </p:sp>
-      <p:sp>
-        <p:nvSpPr>
-          <p:cNvPr id="5" name="Объект 4">
+            <a:r>
+              <a:rPr lang="ru-RU" sz="6000" dirty="0"/>
+              <a:t>Страница объявления</a:t>
+            </a:r>
+          </a:p>
+        </p:txBody>
+      </p:sp>
+      <p:sp>
+        <p:nvSpPr>
+          <p:cNvPr id="3" name="Объект 2">
             <a:extLst>
               <a:ext uri="{FF2B5EF4-FFF2-40B4-BE49-F238E27FC236}">
-                <a16:creationId xmlns:a16="http://schemas.microsoft.com/office/drawing/2014/main" id="{76823D56-EE99-4D32-881F-10AA9FB9271B}"/>
+                <a16:creationId xmlns:a16="http://schemas.microsoft.com/office/drawing/2014/main" id="{C218366D-58E2-49D1-8DBB-29E784DC211B}"/>
               </a:ext>
             </a:extLst>
           </p:cNvPr>
@@ -7872,40 +8822,19 @@
         </p:nvSpPr>
         <p:spPr/>
         <p:txBody>
-          <a:bodyPr>
-            <a:normAutofit/>
-          </a:bodyPr>
-          <a:lstStyle/>
-          <a:p>
-            <a:r>
-              <a:rPr lang="ru-RU" sz="4000" dirty="0" err="1"/>
-              <a:t>Подсайты</a:t>
-            </a:r>
-            <a:r>
-              <a:rPr lang="ru-RU" sz="4000" dirty="0"/>
-              <a:t> для тематик</a:t>
-            </a:r>
-          </a:p>
-          <a:p>
-            <a:r>
-              <a:rPr lang="ru-RU" sz="4000" dirty="0"/>
-              <a:t>Улучшить систему тэгов</a:t>
-            </a:r>
-          </a:p>
-          <a:p>
-            <a:r>
-              <a:rPr lang="ru-RU" sz="4000" dirty="0"/>
-              <a:t>Улучшение пользовательского опыта на основе обратной связи</a:t>
-            </a:r>
-          </a:p>
-        </p:txBody>
-      </p:sp>
-      <p:sp>
-        <p:nvSpPr>
-          <p:cNvPr id="7" name="Номер слайда 6">
+          <a:bodyPr/>
+          <a:lstStyle/>
+          <a:p>
+            <a:endParaRPr lang="ru-RU"/>
+          </a:p>
+        </p:txBody>
+      </p:sp>
+      <p:sp>
+        <p:nvSpPr>
+          <p:cNvPr id="4" name="Номер слайда 3">
             <a:extLst>
               <a:ext uri="{FF2B5EF4-FFF2-40B4-BE49-F238E27FC236}">
-                <a16:creationId xmlns:a16="http://schemas.microsoft.com/office/drawing/2014/main" id="{B72953A7-FF72-4643-9A2C-AF252CB07956}"/>
+                <a16:creationId xmlns:a16="http://schemas.microsoft.com/office/drawing/2014/main" id="{3BA3AF63-0C01-416D-895C-DFB38B7C46EE}"/>
               </a:ext>
             </a:extLst>
           </p:cNvPr>
@@ -7925,14 +8854,44 @@
               <a:rPr lang="ru-RU" sz="3600" smtClean="0"/>
               <a:t>9</a:t>
             </a:fld>
-            <a:endParaRPr lang="ru-RU" sz="2800" dirty="0"/>
-          </a:p>
-        </p:txBody>
-      </p:sp>
+            <a:endParaRPr lang="ru-RU" sz="3600" dirty="0"/>
+          </a:p>
+        </p:txBody>
+      </p:sp>
+      <p:pic>
+        <p:nvPicPr>
+          <p:cNvPr id="6" name="Рисунок 5">
+            <a:extLst>
+              <a:ext uri="{FF2B5EF4-FFF2-40B4-BE49-F238E27FC236}">
+                <a16:creationId xmlns:a16="http://schemas.microsoft.com/office/drawing/2014/main" id="{C0C8D858-0DCD-4FA7-9850-49D2EEC0B01F}"/>
+              </a:ext>
+            </a:extLst>
+          </p:cNvPr>
+          <p:cNvPicPr>
+            <a:picLocks noChangeAspect="1"/>
+          </p:cNvPicPr>
+          <p:nvPr/>
+        </p:nvPicPr>
+        <p:blipFill>
+          <a:blip r:embed="rId2"/>
+          <a:stretch>
+            <a:fillRect/>
+          </a:stretch>
+        </p:blipFill>
+        <p:spPr>
+          <a:xfrm>
+            <a:off x="303745" y="774630"/>
+            <a:ext cx="10679185" cy="5108645"/>
+          </a:xfrm>
+          <a:prstGeom prst="rect">
+            <a:avLst/>
+          </a:prstGeom>
+        </p:spPr>
+      </p:pic>
     </p:spTree>
     <p:extLst>
       <p:ext uri="{BB962C8B-B14F-4D97-AF65-F5344CB8AC3E}">
-        <p14:creationId xmlns:p14="http://schemas.microsoft.com/office/powerpoint/2010/main" val="1332642169"/>
+        <p14:creationId xmlns:p14="http://schemas.microsoft.com/office/powerpoint/2010/main" val="3283967488"/>
       </p:ext>
     </p:extLst>
   </p:cSld>

</xml_diff>